<commit_message>
updating figures and codes
</commit_message>
<xml_diff>
--- a/fig/Fgiure_7.pptx
+++ b/fig/Fgiure_7.pptx
@@ -4,10 +4,12 @@
   <p:sldMasterIdLst>
     <p:sldMasterId id="2147483648" r:id="rId1"/>
   </p:sldMasterIdLst>
+  <p:notesMasterIdLst>
+    <p:notesMasterId r:id="rId4"/>
+  </p:notesMasterIdLst>
   <p:sldIdLst>
     <p:sldId id="256" r:id="rId2"/>
-    <p:sldId id="258" r:id="rId3"/>
-    <p:sldId id="257" r:id="rId4"/>
+    <p:sldId id="257" r:id="rId3"/>
   </p:sldIdLst>
   <p:sldSz cx="12192000" cy="6858000"/>
   <p:notesSz cx="6858000" cy="9144000"/>
@@ -125,6 +127,450 @@
 </p:presentation>
 </file>
 
+<file path=ppt/notesMasters/notesMaster1.xml><?xml version="1.0" encoding="utf-8"?>
+<p:notesMaster xmlns:a="http://schemas.openxmlformats.org/drawingml/2006/main" xmlns:r="http://schemas.openxmlformats.org/officeDocument/2006/relationships" xmlns:p="http://schemas.openxmlformats.org/presentationml/2006/main">
+  <p:cSld>
+    <p:bg>
+      <p:bgRef idx="1001">
+        <a:schemeClr val="bg1"/>
+      </p:bgRef>
+    </p:bg>
+    <p:spTree>
+      <p:nvGrpSpPr>
+        <p:cNvPr id="1" name=""/>
+        <p:cNvGrpSpPr/>
+        <p:nvPr/>
+      </p:nvGrpSpPr>
+      <p:grpSpPr>
+        <a:xfrm>
+          <a:off x="0" y="0"/>
+          <a:ext cx="0" cy="0"/>
+          <a:chOff x="0" y="0"/>
+          <a:chExt cx="0" cy="0"/>
+        </a:xfrm>
+      </p:grpSpPr>
+      <p:sp>
+        <p:nvSpPr>
+          <p:cNvPr id="2" name="Header Placeholder 1"/>
+          <p:cNvSpPr>
+            <a:spLocks noGrp="1"/>
+          </p:cNvSpPr>
+          <p:nvPr>
+            <p:ph type="hdr" sz="quarter"/>
+          </p:nvPr>
+        </p:nvSpPr>
+        <p:spPr>
+          <a:xfrm>
+            <a:off x="0" y="0"/>
+            <a:ext cx="2971800" cy="458788"/>
+          </a:xfrm>
+          <a:prstGeom prst="rect">
+            <a:avLst/>
+          </a:prstGeom>
+        </p:spPr>
+        <p:txBody>
+          <a:bodyPr vert="horz" lIns="91440" tIns="45720" rIns="91440" bIns="45720" rtlCol="0"/>
+          <a:lstStyle>
+            <a:lvl1pPr algn="l">
+              <a:defRPr sz="1200"/>
+            </a:lvl1pPr>
+          </a:lstStyle>
+          <a:p>
+            <a:endParaRPr lang="en-US"/>
+          </a:p>
+        </p:txBody>
+      </p:sp>
+      <p:sp>
+        <p:nvSpPr>
+          <p:cNvPr id="3" name="Date Placeholder 2"/>
+          <p:cNvSpPr>
+            <a:spLocks noGrp="1"/>
+          </p:cNvSpPr>
+          <p:nvPr>
+            <p:ph type="dt" idx="1"/>
+          </p:nvPr>
+        </p:nvSpPr>
+        <p:spPr>
+          <a:xfrm>
+            <a:off x="3884613" y="0"/>
+            <a:ext cx="2971800" cy="458788"/>
+          </a:xfrm>
+          <a:prstGeom prst="rect">
+            <a:avLst/>
+          </a:prstGeom>
+        </p:spPr>
+        <p:txBody>
+          <a:bodyPr vert="horz" lIns="91440" tIns="45720" rIns="91440" bIns="45720" rtlCol="0"/>
+          <a:lstStyle>
+            <a:lvl1pPr algn="r">
+              <a:defRPr sz="1200"/>
+            </a:lvl1pPr>
+          </a:lstStyle>
+          <a:p>
+            <a:fld id="{5E129DCB-A1AE-AD47-A231-ACFAF58196FA}" type="datetimeFigureOut">
+              <a:rPr lang="en-US" smtClean="0"/>
+              <a:t>5/25/23</a:t>
+            </a:fld>
+            <a:endParaRPr lang="en-US"/>
+          </a:p>
+        </p:txBody>
+      </p:sp>
+      <p:sp>
+        <p:nvSpPr>
+          <p:cNvPr id="4" name="Slide Image Placeholder 3"/>
+          <p:cNvSpPr>
+            <a:spLocks noGrp="1" noRot="1" noChangeAspect="1"/>
+          </p:cNvSpPr>
+          <p:nvPr>
+            <p:ph type="sldImg" idx="2"/>
+          </p:nvPr>
+        </p:nvSpPr>
+        <p:spPr>
+          <a:xfrm>
+            <a:off x="685800" y="1143000"/>
+            <a:ext cx="5486400" cy="3086100"/>
+          </a:xfrm>
+          <a:prstGeom prst="rect">
+            <a:avLst/>
+          </a:prstGeom>
+          <a:noFill/>
+          <a:ln w="12700">
+            <a:solidFill>
+              <a:prstClr val="black"/>
+            </a:solidFill>
+          </a:ln>
+        </p:spPr>
+        <p:txBody>
+          <a:bodyPr vert="horz" lIns="91440" tIns="45720" rIns="91440" bIns="45720" rtlCol="0" anchor="ctr"/>
+          <a:lstStyle/>
+          <a:p>
+            <a:endParaRPr lang="en-US"/>
+          </a:p>
+        </p:txBody>
+      </p:sp>
+      <p:sp>
+        <p:nvSpPr>
+          <p:cNvPr id="5" name="Notes Placeholder 4"/>
+          <p:cNvSpPr>
+            <a:spLocks noGrp="1"/>
+          </p:cNvSpPr>
+          <p:nvPr>
+            <p:ph type="body" sz="quarter" idx="3"/>
+          </p:nvPr>
+        </p:nvSpPr>
+        <p:spPr>
+          <a:xfrm>
+            <a:off x="685800" y="4400550"/>
+            <a:ext cx="5486400" cy="3600450"/>
+          </a:xfrm>
+          <a:prstGeom prst="rect">
+            <a:avLst/>
+          </a:prstGeom>
+        </p:spPr>
+        <p:txBody>
+          <a:bodyPr vert="horz" lIns="91440" tIns="45720" rIns="91440" bIns="45720" rtlCol="0"/>
+          <a:lstStyle/>
+          <a:p>
+            <a:pPr lvl="0"/>
+            <a:r>
+              <a:rPr lang="en-US"/>
+              <a:t>Click to edit Master text styles</a:t>
+            </a:r>
+          </a:p>
+          <a:p>
+            <a:pPr lvl="1"/>
+            <a:r>
+              <a:rPr lang="en-US"/>
+              <a:t>Second level</a:t>
+            </a:r>
+          </a:p>
+          <a:p>
+            <a:pPr lvl="2"/>
+            <a:r>
+              <a:rPr lang="en-US"/>
+              <a:t>Third level</a:t>
+            </a:r>
+          </a:p>
+          <a:p>
+            <a:pPr lvl="3"/>
+            <a:r>
+              <a:rPr lang="en-US"/>
+              <a:t>Fourth level</a:t>
+            </a:r>
+          </a:p>
+          <a:p>
+            <a:pPr lvl="4"/>
+            <a:r>
+              <a:rPr lang="en-US"/>
+              <a:t>Fifth level</a:t>
+            </a:r>
+          </a:p>
+        </p:txBody>
+      </p:sp>
+      <p:sp>
+        <p:nvSpPr>
+          <p:cNvPr id="6" name="Footer Placeholder 5"/>
+          <p:cNvSpPr>
+            <a:spLocks noGrp="1"/>
+          </p:cNvSpPr>
+          <p:nvPr>
+            <p:ph type="ftr" sz="quarter" idx="4"/>
+          </p:nvPr>
+        </p:nvSpPr>
+        <p:spPr>
+          <a:xfrm>
+            <a:off x="0" y="8685213"/>
+            <a:ext cx="2971800" cy="458787"/>
+          </a:xfrm>
+          <a:prstGeom prst="rect">
+            <a:avLst/>
+          </a:prstGeom>
+        </p:spPr>
+        <p:txBody>
+          <a:bodyPr vert="horz" lIns="91440" tIns="45720" rIns="91440" bIns="45720" rtlCol="0" anchor="b"/>
+          <a:lstStyle>
+            <a:lvl1pPr algn="l">
+              <a:defRPr sz="1200"/>
+            </a:lvl1pPr>
+          </a:lstStyle>
+          <a:p>
+            <a:endParaRPr lang="en-US"/>
+          </a:p>
+        </p:txBody>
+      </p:sp>
+      <p:sp>
+        <p:nvSpPr>
+          <p:cNvPr id="7" name="Slide Number Placeholder 6"/>
+          <p:cNvSpPr>
+            <a:spLocks noGrp="1"/>
+          </p:cNvSpPr>
+          <p:nvPr>
+            <p:ph type="sldNum" sz="quarter" idx="5"/>
+          </p:nvPr>
+        </p:nvSpPr>
+        <p:spPr>
+          <a:xfrm>
+            <a:off x="3884613" y="8685213"/>
+            <a:ext cx="2971800" cy="458787"/>
+          </a:xfrm>
+          <a:prstGeom prst="rect">
+            <a:avLst/>
+          </a:prstGeom>
+        </p:spPr>
+        <p:txBody>
+          <a:bodyPr vert="horz" lIns="91440" tIns="45720" rIns="91440" bIns="45720" rtlCol="0" anchor="b"/>
+          <a:lstStyle>
+            <a:lvl1pPr algn="r">
+              <a:defRPr sz="1200"/>
+            </a:lvl1pPr>
+          </a:lstStyle>
+          <a:p>
+            <a:fld id="{492A02E4-2FC1-3F4A-98C6-1F6C13ADC5A1}" type="slidenum">
+              <a:rPr lang="en-US" smtClean="0"/>
+              <a:t>‹#›</a:t>
+            </a:fld>
+            <a:endParaRPr lang="en-US"/>
+          </a:p>
+        </p:txBody>
+      </p:sp>
+    </p:spTree>
+    <p:extLst>
+      <p:ext uri="{BB962C8B-B14F-4D97-AF65-F5344CB8AC3E}">
+        <p14:creationId xmlns:p14="http://schemas.microsoft.com/office/powerpoint/2010/main" val="275246146"/>
+      </p:ext>
+    </p:extLst>
+  </p:cSld>
+  <p:clrMap bg1="lt1" tx1="dk1" bg2="lt2" tx2="dk2" accent1="accent1" accent2="accent2" accent3="accent3" accent4="accent4" accent5="accent5" accent6="accent6" hlink="hlink" folHlink="folHlink"/>
+  <p:notesStyle>
+    <a:lvl1pPr marL="0" algn="l" defTabSz="914400" rtl="0" eaLnBrk="1" latinLnBrk="0" hangingPunct="1">
+      <a:defRPr sz="1200" kern="1200">
+        <a:solidFill>
+          <a:schemeClr val="tx1"/>
+        </a:solidFill>
+        <a:latin typeface="+mn-lt"/>
+        <a:ea typeface="+mn-ea"/>
+        <a:cs typeface="+mn-cs"/>
+      </a:defRPr>
+    </a:lvl1pPr>
+    <a:lvl2pPr marL="457200" algn="l" defTabSz="914400" rtl="0" eaLnBrk="1" latinLnBrk="0" hangingPunct="1">
+      <a:defRPr sz="1200" kern="1200">
+        <a:solidFill>
+          <a:schemeClr val="tx1"/>
+        </a:solidFill>
+        <a:latin typeface="+mn-lt"/>
+        <a:ea typeface="+mn-ea"/>
+        <a:cs typeface="+mn-cs"/>
+      </a:defRPr>
+    </a:lvl2pPr>
+    <a:lvl3pPr marL="914400" algn="l" defTabSz="914400" rtl="0" eaLnBrk="1" latinLnBrk="0" hangingPunct="1">
+      <a:defRPr sz="1200" kern="1200">
+        <a:solidFill>
+          <a:schemeClr val="tx1"/>
+        </a:solidFill>
+        <a:latin typeface="+mn-lt"/>
+        <a:ea typeface="+mn-ea"/>
+        <a:cs typeface="+mn-cs"/>
+      </a:defRPr>
+    </a:lvl3pPr>
+    <a:lvl4pPr marL="1371600" algn="l" defTabSz="914400" rtl="0" eaLnBrk="1" latinLnBrk="0" hangingPunct="1">
+      <a:defRPr sz="1200" kern="1200">
+        <a:solidFill>
+          <a:schemeClr val="tx1"/>
+        </a:solidFill>
+        <a:latin typeface="+mn-lt"/>
+        <a:ea typeface="+mn-ea"/>
+        <a:cs typeface="+mn-cs"/>
+      </a:defRPr>
+    </a:lvl4pPr>
+    <a:lvl5pPr marL="1828800" algn="l" defTabSz="914400" rtl="0" eaLnBrk="1" latinLnBrk="0" hangingPunct="1">
+      <a:defRPr sz="1200" kern="1200">
+        <a:solidFill>
+          <a:schemeClr val="tx1"/>
+        </a:solidFill>
+        <a:latin typeface="+mn-lt"/>
+        <a:ea typeface="+mn-ea"/>
+        <a:cs typeface="+mn-cs"/>
+      </a:defRPr>
+    </a:lvl5pPr>
+    <a:lvl6pPr marL="2286000" algn="l" defTabSz="914400" rtl="0" eaLnBrk="1" latinLnBrk="0" hangingPunct="1">
+      <a:defRPr sz="1200" kern="1200">
+        <a:solidFill>
+          <a:schemeClr val="tx1"/>
+        </a:solidFill>
+        <a:latin typeface="+mn-lt"/>
+        <a:ea typeface="+mn-ea"/>
+        <a:cs typeface="+mn-cs"/>
+      </a:defRPr>
+    </a:lvl6pPr>
+    <a:lvl7pPr marL="2743200" algn="l" defTabSz="914400" rtl="0" eaLnBrk="1" latinLnBrk="0" hangingPunct="1">
+      <a:defRPr sz="1200" kern="1200">
+        <a:solidFill>
+          <a:schemeClr val="tx1"/>
+        </a:solidFill>
+        <a:latin typeface="+mn-lt"/>
+        <a:ea typeface="+mn-ea"/>
+        <a:cs typeface="+mn-cs"/>
+      </a:defRPr>
+    </a:lvl7pPr>
+    <a:lvl8pPr marL="3200400" algn="l" defTabSz="914400" rtl="0" eaLnBrk="1" latinLnBrk="0" hangingPunct="1">
+      <a:defRPr sz="1200" kern="1200">
+        <a:solidFill>
+          <a:schemeClr val="tx1"/>
+        </a:solidFill>
+        <a:latin typeface="+mn-lt"/>
+        <a:ea typeface="+mn-ea"/>
+        <a:cs typeface="+mn-cs"/>
+      </a:defRPr>
+    </a:lvl8pPr>
+    <a:lvl9pPr marL="3657600" algn="l" defTabSz="914400" rtl="0" eaLnBrk="1" latinLnBrk="0" hangingPunct="1">
+      <a:defRPr sz="1200" kern="1200">
+        <a:solidFill>
+          <a:schemeClr val="tx1"/>
+        </a:solidFill>
+        <a:latin typeface="+mn-lt"/>
+        <a:ea typeface="+mn-ea"/>
+        <a:cs typeface="+mn-cs"/>
+      </a:defRPr>
+    </a:lvl9pPr>
+  </p:notesStyle>
+</p:notesMaster>
+</file>
+
+<file path=ppt/notesSlides/notesSlide1.xml><?xml version="1.0" encoding="utf-8"?>
+<p:notes xmlns:a="http://schemas.openxmlformats.org/drawingml/2006/main" xmlns:r="http://schemas.openxmlformats.org/officeDocument/2006/relationships" xmlns:p="http://schemas.openxmlformats.org/presentationml/2006/main">
+  <p:cSld>
+    <p:spTree>
+      <p:nvGrpSpPr>
+        <p:cNvPr id="1" name=""/>
+        <p:cNvGrpSpPr/>
+        <p:nvPr/>
+      </p:nvGrpSpPr>
+      <p:grpSpPr>
+        <a:xfrm>
+          <a:off x="0" y="0"/>
+          <a:ext cx="0" cy="0"/>
+          <a:chOff x="0" y="0"/>
+          <a:chExt cx="0" cy="0"/>
+        </a:xfrm>
+      </p:grpSpPr>
+      <p:sp>
+        <p:nvSpPr>
+          <p:cNvPr id="2" name="Slide Image Placeholder 1"/>
+          <p:cNvSpPr>
+            <a:spLocks noGrp="1" noRot="1" noChangeAspect="1"/>
+          </p:cNvSpPr>
+          <p:nvPr>
+            <p:ph type="sldImg"/>
+          </p:nvPr>
+        </p:nvSpPr>
+        <p:spPr/>
+      </p:sp>
+      <p:sp>
+        <p:nvSpPr>
+          <p:cNvPr id="3" name="Notes Placeholder 2"/>
+          <p:cNvSpPr>
+            <a:spLocks noGrp="1"/>
+          </p:cNvSpPr>
+          <p:nvPr>
+            <p:ph type="body" idx="1"/>
+          </p:nvPr>
+        </p:nvSpPr>
+        <p:spPr/>
+        <p:txBody>
+          <a:bodyPr/>
+          <a:lstStyle/>
+          <a:p>
+            <a:r>
+              <a:rPr lang="en-US" dirty="0"/>
+              <a:t>The digit indicates the segment ID and the number following that is the distance in 10km… for example 101 means first 10 km segment from 05CK004, </a:t>
+            </a:r>
+            <a:r>
+              <a:rPr lang="en-US" dirty="0" err="1"/>
+              <a:t>etc</a:t>
+            </a:r>
+            <a:r>
+              <a:rPr lang="en-US" dirty="0"/>
+              <a:t>…</a:t>
+            </a:r>
+          </a:p>
+        </p:txBody>
+      </p:sp>
+      <p:sp>
+        <p:nvSpPr>
+          <p:cNvPr id="4" name="Slide Number Placeholder 3"/>
+          <p:cNvSpPr>
+            <a:spLocks noGrp="1"/>
+          </p:cNvSpPr>
+          <p:nvPr>
+            <p:ph type="sldNum" sz="quarter" idx="5"/>
+          </p:nvPr>
+        </p:nvSpPr>
+        <p:spPr/>
+        <p:txBody>
+          <a:bodyPr/>
+          <a:lstStyle/>
+          <a:p>
+            <a:fld id="{492A02E4-2FC1-3F4A-98C6-1F6C13ADC5A1}" type="slidenum">
+              <a:rPr lang="en-US" smtClean="0"/>
+              <a:t>2</a:t>
+            </a:fld>
+            <a:endParaRPr lang="en-US"/>
+          </a:p>
+        </p:txBody>
+      </p:sp>
+    </p:spTree>
+    <p:extLst>
+      <p:ext uri="{BB962C8B-B14F-4D97-AF65-F5344CB8AC3E}">
+        <p14:creationId xmlns:p14="http://schemas.microsoft.com/office/powerpoint/2010/main" val="4027258184"/>
+      </p:ext>
+    </p:extLst>
+  </p:cSld>
+  <p:clrMapOvr>
+    <a:masterClrMapping/>
+  </p:clrMapOvr>
+</p:notes>
+</file>
+
 <file path=ppt/slideLayouts/slideLayout1.xml><?xml version="1.0" encoding="utf-8"?>
 <p:sldLayout xmlns:a="http://schemas.openxmlformats.org/drawingml/2006/main" xmlns:r="http://schemas.openxmlformats.org/officeDocument/2006/relationships" xmlns:p="http://schemas.openxmlformats.org/presentationml/2006/main" type="title" preserve="1">
   <p:cSld name="Title Slide">
@@ -272,7 +718,7 @@
           <a:p>
             <a:fld id="{53C9A6E3-773F-C84A-BA76-C1EA0783F9FD}" type="datetimeFigureOut">
               <a:rPr lang="en-US" smtClean="0"/>
-              <a:t>2/4/22</a:t>
+              <a:t>5/25/23</a:t>
             </a:fld>
             <a:endParaRPr lang="en-US"/>
           </a:p>
@@ -470,7 +916,7 @@
           <a:p>
             <a:fld id="{53C9A6E3-773F-C84A-BA76-C1EA0783F9FD}" type="datetimeFigureOut">
               <a:rPr lang="en-US" smtClean="0"/>
-              <a:t>2/4/22</a:t>
+              <a:t>5/25/23</a:t>
             </a:fld>
             <a:endParaRPr lang="en-US"/>
           </a:p>
@@ -678,7 +1124,7 @@
           <a:p>
             <a:fld id="{53C9A6E3-773F-C84A-BA76-C1EA0783F9FD}" type="datetimeFigureOut">
               <a:rPr lang="en-US" smtClean="0"/>
-              <a:t>2/4/22</a:t>
+              <a:t>5/25/23</a:t>
             </a:fld>
             <a:endParaRPr lang="en-US"/>
           </a:p>
@@ -876,7 +1322,7 @@
           <a:p>
             <a:fld id="{53C9A6E3-773F-C84A-BA76-C1EA0783F9FD}" type="datetimeFigureOut">
               <a:rPr lang="en-US" smtClean="0"/>
-              <a:t>2/4/22</a:t>
+              <a:t>5/25/23</a:t>
             </a:fld>
             <a:endParaRPr lang="en-US"/>
           </a:p>
@@ -1151,7 +1597,7 @@
           <a:p>
             <a:fld id="{53C9A6E3-773F-C84A-BA76-C1EA0783F9FD}" type="datetimeFigureOut">
               <a:rPr lang="en-US" smtClean="0"/>
-              <a:t>2/4/22</a:t>
+              <a:t>5/25/23</a:t>
             </a:fld>
             <a:endParaRPr lang="en-US"/>
           </a:p>
@@ -1416,7 +1862,7 @@
           <a:p>
             <a:fld id="{53C9A6E3-773F-C84A-BA76-C1EA0783F9FD}" type="datetimeFigureOut">
               <a:rPr lang="en-US" smtClean="0"/>
-              <a:t>2/4/22</a:t>
+              <a:t>5/25/23</a:t>
             </a:fld>
             <a:endParaRPr lang="en-US"/>
           </a:p>
@@ -1828,7 +2274,7 @@
           <a:p>
             <a:fld id="{53C9A6E3-773F-C84A-BA76-C1EA0783F9FD}" type="datetimeFigureOut">
               <a:rPr lang="en-US" smtClean="0"/>
-              <a:t>2/4/22</a:t>
+              <a:t>5/25/23</a:t>
             </a:fld>
             <a:endParaRPr lang="en-US"/>
           </a:p>
@@ -1969,7 +2415,7 @@
           <a:p>
             <a:fld id="{53C9A6E3-773F-C84A-BA76-C1EA0783F9FD}" type="datetimeFigureOut">
               <a:rPr lang="en-US" smtClean="0"/>
-              <a:t>2/4/22</a:t>
+              <a:t>5/25/23</a:t>
             </a:fld>
             <a:endParaRPr lang="en-US"/>
           </a:p>
@@ -2082,7 +2528,7 @@
           <a:p>
             <a:fld id="{53C9A6E3-773F-C84A-BA76-C1EA0783F9FD}" type="datetimeFigureOut">
               <a:rPr lang="en-US" smtClean="0"/>
-              <a:t>2/4/22</a:t>
+              <a:t>5/25/23</a:t>
             </a:fld>
             <a:endParaRPr lang="en-US"/>
           </a:p>
@@ -2393,7 +2839,7 @@
           <a:p>
             <a:fld id="{53C9A6E3-773F-C84A-BA76-C1EA0783F9FD}" type="datetimeFigureOut">
               <a:rPr lang="en-US" smtClean="0"/>
-              <a:t>2/4/22</a:t>
+              <a:t>5/25/23</a:t>
             </a:fld>
             <a:endParaRPr lang="en-US"/>
           </a:p>
@@ -2681,7 +3127,7 @@
           <a:p>
             <a:fld id="{53C9A6E3-773F-C84A-BA76-C1EA0783F9FD}" type="datetimeFigureOut">
               <a:rPr lang="en-US" smtClean="0"/>
-              <a:t>2/4/22</a:t>
+              <a:t>5/25/23</a:t>
             </a:fld>
             <a:endParaRPr lang="en-US"/>
           </a:p>
@@ -2922,7 +3368,7 @@
           <a:p>
             <a:fld id="{53C9A6E3-773F-C84A-BA76-C1EA0783F9FD}" type="datetimeFigureOut">
               <a:rPr lang="en-US" smtClean="0"/>
-              <a:t>2/4/22</a:t>
+              <a:t>5/25/23</a:t>
             </a:fld>
             <a:endParaRPr lang="en-US"/>
           </a:p>
@@ -5521,7 +5967,7 @@
         </p:nvCxnSpPr>
         <p:spPr>
           <a:xfrm>
-            <a:off x="2680138" y="4803228"/>
+            <a:off x="2680138" y="4335140"/>
             <a:ext cx="1707931" cy="0"/>
           </a:xfrm>
           <a:prstGeom prst="line">
@@ -5566,7 +6012,7 @@
         <p:spPr>
           <a:xfrm>
             <a:off x="4388069" y="3429000"/>
-            <a:ext cx="0" cy="1374228"/>
+            <a:ext cx="0" cy="918498"/>
           </a:xfrm>
           <a:prstGeom prst="line">
             <a:avLst/>
@@ -5863,7 +6309,7 @@
         </p:nvSpPr>
         <p:spPr>
           <a:xfrm>
-            <a:off x="1602821" y="4618562"/>
+            <a:off x="1668137" y="4161361"/>
             <a:ext cx="1345312" cy="369332"/>
           </a:xfrm>
           <a:prstGeom prst="rect">
@@ -5940,7 +6386,7 @@
         <p:spPr>
           <a:xfrm>
             <a:off x="8797165" y="4347498"/>
-            <a:ext cx="1345312" cy="369332"/>
+            <a:ext cx="1179295" cy="369332"/>
           </a:xfrm>
           <a:prstGeom prst="rect">
             <a:avLst/>
@@ -5978,7 +6424,7 @@
         <p:spPr>
           <a:xfrm>
             <a:off x="8659193" y="735412"/>
-            <a:ext cx="1345312" cy="369332"/>
+            <a:ext cx="1159722" cy="369332"/>
           </a:xfrm>
           <a:prstGeom prst="rect">
             <a:avLst/>
@@ -5998,6 +6444,7 @@
               </a:rPr>
               <a:t>05HG001</a:t>
             </a:r>
+            <a:endParaRPr lang="en-CA" sz="900" dirty="0"/>
           </a:p>
         </p:txBody>
       </p:sp>
@@ -6311,7 +6758,7 @@
         </p:nvSpPr>
         <p:spPr>
           <a:xfrm>
-            <a:off x="8996857" y="5113401"/>
+            <a:off x="4735004" y="704914"/>
             <a:ext cx="2758984" cy="369332"/>
           </a:xfrm>
           <a:prstGeom prst="rect">
@@ -6349,7 +6796,7 @@
         </p:nvSpPr>
         <p:spPr>
           <a:xfrm>
-            <a:off x="8996857" y="5486644"/>
+            <a:off x="4735004" y="1078157"/>
             <a:ext cx="2324120" cy="369332"/>
           </a:xfrm>
           <a:prstGeom prst="rect">
@@ -6387,7 +6834,7 @@
         </p:nvSpPr>
         <p:spPr>
           <a:xfrm>
-            <a:off x="8996857" y="5855976"/>
+            <a:off x="4735004" y="1447489"/>
             <a:ext cx="1770127" cy="369332"/>
           </a:xfrm>
           <a:prstGeom prst="rect">
@@ -6425,7 +6872,7 @@
         </p:nvSpPr>
         <p:spPr>
           <a:xfrm>
-            <a:off x="9020080" y="6225308"/>
+            <a:off x="4758227" y="1816821"/>
             <a:ext cx="2300897" cy="369332"/>
           </a:xfrm>
           <a:prstGeom prst="rect">
@@ -6465,8 +6912,8 @@
         </p:nvCxnSpPr>
         <p:spPr>
           <a:xfrm flipH="1">
-            <a:off x="8113986" y="6064135"/>
-            <a:ext cx="850001" cy="0"/>
+            <a:off x="3852133" y="1655648"/>
+            <a:ext cx="810588" cy="0"/>
           </a:xfrm>
           <a:prstGeom prst="line">
             <a:avLst/>
@@ -6508,7 +6955,7 @@
         </p:nvCxnSpPr>
         <p:spPr>
           <a:xfrm>
-            <a:off x="8113986" y="5306280"/>
+            <a:off x="3852133" y="897793"/>
             <a:ext cx="810588" cy="0"/>
           </a:xfrm>
           <a:prstGeom prst="line">
@@ -6551,7 +6998,7 @@
         </p:nvCxnSpPr>
         <p:spPr>
           <a:xfrm>
-            <a:off x="8113986" y="6409974"/>
+            <a:off x="3852133" y="2001487"/>
             <a:ext cx="810588" cy="0"/>
           </a:xfrm>
           <a:prstGeom prst="line">
@@ -6595,7 +7042,7 @@
         </p:nvCxnSpPr>
         <p:spPr>
           <a:xfrm>
-            <a:off x="8113986" y="5692330"/>
+            <a:off x="3852133" y="1283843"/>
             <a:ext cx="815843" cy="1"/>
           </a:xfrm>
           <a:prstGeom prst="line">
@@ -6625,10 +7072,10 @@
       </p:cxnSp>
       <p:sp>
         <p:nvSpPr>
-          <p:cNvPr id="40" name="TextBox 39">
-            <a:extLst>
-              <a:ext uri="{FF2B5EF4-FFF2-40B4-BE49-F238E27FC236}">
-                <a16:creationId xmlns:a16="http://schemas.microsoft.com/office/drawing/2014/main" id="{13B1A551-0032-8448-9039-8279A26CB11B}"/>
+          <p:cNvPr id="42" name="TextBox 41">
+            <a:extLst>
+              <a:ext uri="{FF2B5EF4-FFF2-40B4-BE49-F238E27FC236}">
+                <a16:creationId xmlns:a16="http://schemas.microsoft.com/office/drawing/2014/main" id="{E0B79A3D-AD25-5542-BA5E-C6A58B54EE28}"/>
               </a:ext>
             </a:extLst>
           </p:cNvPr>
@@ -6637,8 +7084,8 @@
         </p:nvSpPr>
         <p:spPr>
           <a:xfrm>
-            <a:off x="3557734" y="4433895"/>
-            <a:ext cx="951186" cy="369332"/>
+            <a:off x="4004899" y="2251874"/>
+            <a:ext cx="951186" cy="307777"/>
           </a:xfrm>
           <a:prstGeom prst="rect">
             <a:avLst/>
@@ -6652,18 +7099,21 @@
           <a:lstStyle/>
           <a:p>
             <a:r>
-              <a:rPr lang="en-US" dirty="0"/>
-              <a:t>230 km</a:t>
-            </a:r>
-          </a:p>
-        </p:txBody>
-      </p:sp>
-      <p:sp>
-        <p:nvSpPr>
-          <p:cNvPr id="42" name="TextBox 41">
-            <a:extLst>
-              <a:ext uri="{FF2B5EF4-FFF2-40B4-BE49-F238E27FC236}">
-                <a16:creationId xmlns:a16="http://schemas.microsoft.com/office/drawing/2014/main" id="{B9AD54C2-AC73-4B4C-82BB-1455A49B74CB}"/>
+              <a:rPr lang="en-US" sz="1400" dirty="0">
+                <a:latin typeface="Times New Roman" panose="02020603050405020304" pitchFamily="18" charset="0"/>
+                <a:cs typeface="Times New Roman" panose="02020603050405020304" pitchFamily="18" charset="0"/>
+              </a:rPr>
+              <a:t>70 km</a:t>
+            </a:r>
+          </a:p>
+        </p:txBody>
+      </p:sp>
+      <p:sp>
+        <p:nvSpPr>
+          <p:cNvPr id="43" name="TextBox 42">
+            <a:extLst>
+              <a:ext uri="{FF2B5EF4-FFF2-40B4-BE49-F238E27FC236}">
+                <a16:creationId xmlns:a16="http://schemas.microsoft.com/office/drawing/2014/main" id="{19B7CCF3-B700-0644-B334-5277A297C4B2}"/>
               </a:ext>
             </a:extLst>
           </p:cNvPr>
@@ -6672,8 +7122,8 @@
         </p:nvSpPr>
         <p:spPr>
           <a:xfrm>
-            <a:off x="3972241" y="2208330"/>
-            <a:ext cx="951186" cy="369332"/>
+            <a:off x="3633936" y="4009351"/>
+            <a:ext cx="951186" cy="307777"/>
           </a:xfrm>
           <a:prstGeom prst="rect">
             <a:avLst/>
@@ -6687,18 +7137,21 @@
           <a:lstStyle/>
           <a:p>
             <a:r>
-              <a:rPr lang="en-US" dirty="0"/>
-              <a:t>70 km</a:t>
-            </a:r>
-          </a:p>
-        </p:txBody>
-      </p:sp>
-      <p:sp>
-        <p:nvSpPr>
-          <p:cNvPr id="43" name="TextBox 42">
-            <a:extLst>
-              <a:ext uri="{FF2B5EF4-FFF2-40B4-BE49-F238E27FC236}">
-                <a16:creationId xmlns:a16="http://schemas.microsoft.com/office/drawing/2014/main" id="{CA4EE01D-AB2F-4548-8D3A-E5D3763C2FFC}"/>
+              <a:rPr lang="en-US" sz="1400" dirty="0">
+                <a:latin typeface="Times New Roman" panose="02020603050405020304" pitchFamily="18" charset="0"/>
+                <a:cs typeface="Times New Roman" panose="02020603050405020304" pitchFamily="18" charset="0"/>
+              </a:rPr>
+              <a:t>230 km</a:t>
+            </a:r>
+          </a:p>
+        </p:txBody>
+      </p:sp>
+      <p:sp>
+        <p:nvSpPr>
+          <p:cNvPr id="48" name="TextBox 47">
+            <a:extLst>
+              <a:ext uri="{FF2B5EF4-FFF2-40B4-BE49-F238E27FC236}">
+                <a16:creationId xmlns:a16="http://schemas.microsoft.com/office/drawing/2014/main" id="{6A54D9C1-E227-8146-AE04-FE08C22E9625}"/>
               </a:ext>
             </a:extLst>
           </p:cNvPr>
@@ -6707,8 +7160,8 @@
         </p:nvSpPr>
         <p:spPr>
           <a:xfrm>
-            <a:off x="4724400" y="3078903"/>
-            <a:ext cx="951186" cy="369332"/>
+            <a:off x="4757058" y="3111561"/>
+            <a:ext cx="951186" cy="307777"/>
           </a:xfrm>
           <a:prstGeom prst="rect">
             <a:avLst/>
@@ -6722,7 +7175,10 @@
           <a:lstStyle/>
           <a:p>
             <a:r>
-              <a:rPr lang="en-US" dirty="0"/>
+              <a:rPr lang="en-US" sz="1400" dirty="0">
+                <a:latin typeface="Times New Roman" panose="02020603050405020304" pitchFamily="18" charset="0"/>
+                <a:cs typeface="Times New Roman" panose="02020603050405020304" pitchFamily="18" charset="0"/>
+              </a:rPr>
               <a:t>50 km</a:t>
             </a:r>
           </a:p>
@@ -6730,10 +7186,10 @@
       </p:sp>
       <p:sp>
         <p:nvSpPr>
-          <p:cNvPr id="48" name="TextBox 47">
-            <a:extLst>
-              <a:ext uri="{FF2B5EF4-FFF2-40B4-BE49-F238E27FC236}">
-                <a16:creationId xmlns:a16="http://schemas.microsoft.com/office/drawing/2014/main" id="{298933D9-B2D9-2844-9DC1-EE889FF16F89}"/>
+          <p:cNvPr id="50" name="TextBox 49">
+            <a:extLst>
+              <a:ext uri="{FF2B5EF4-FFF2-40B4-BE49-F238E27FC236}">
+                <a16:creationId xmlns:a16="http://schemas.microsoft.com/office/drawing/2014/main" id="{31BCE83C-3CA6-5E47-926D-1A3BCC4F9B2D}"/>
               </a:ext>
             </a:extLst>
           </p:cNvPr>
@@ -6742,8 +7198,8 @@
         </p:nvSpPr>
         <p:spPr>
           <a:xfrm>
-            <a:off x="6448096" y="3779627"/>
-            <a:ext cx="951186" cy="369332"/>
+            <a:off x="6426324" y="3790513"/>
+            <a:ext cx="951186" cy="307777"/>
           </a:xfrm>
           <a:prstGeom prst="rect">
             <a:avLst/>
@@ -6757,7 +7213,10 @@
           <a:lstStyle/>
           <a:p>
             <a:r>
-              <a:rPr lang="en-US" dirty="0"/>
+              <a:rPr lang="en-US" sz="1400" dirty="0">
+                <a:latin typeface="Times New Roman" panose="02020603050405020304" pitchFamily="18" charset="0"/>
+                <a:cs typeface="Times New Roman" panose="02020603050405020304" pitchFamily="18" charset="0"/>
+              </a:rPr>
               <a:t>60 km</a:t>
             </a:r>
           </a:p>
@@ -6765,10 +7224,10 @@
       </p:sp>
       <p:sp>
         <p:nvSpPr>
-          <p:cNvPr id="50" name="TextBox 49">
-            <a:extLst>
-              <a:ext uri="{FF2B5EF4-FFF2-40B4-BE49-F238E27FC236}">
-                <a16:creationId xmlns:a16="http://schemas.microsoft.com/office/drawing/2014/main" id="{9CCFFD57-1D60-9B4F-9D7C-2A90D1972D5F}"/>
+          <p:cNvPr id="52" name="TextBox 51">
+            <a:extLst>
+              <a:ext uri="{FF2B5EF4-FFF2-40B4-BE49-F238E27FC236}">
+                <a16:creationId xmlns:a16="http://schemas.microsoft.com/office/drawing/2014/main" id="{3C813A3D-791E-B845-9ECE-E9C76114E3E0}"/>
               </a:ext>
             </a:extLst>
           </p:cNvPr>
@@ -6778,7 +7237,7 @@
         <p:spPr>
           <a:xfrm>
             <a:off x="9243263" y="1435010"/>
-            <a:ext cx="951186" cy="369332"/>
+            <a:ext cx="951186" cy="307777"/>
           </a:xfrm>
           <a:prstGeom prst="rect">
             <a:avLst/>
@@ -6792,48 +7251,65 @@
           <a:lstStyle/>
           <a:p>
             <a:r>
-              <a:rPr lang="en-US" dirty="0"/>
+              <a:rPr lang="en-US" sz="1400" dirty="0">
+                <a:latin typeface="Times New Roman" panose="02020603050405020304" pitchFamily="18" charset="0"/>
+                <a:cs typeface="Times New Roman" panose="02020603050405020304" pitchFamily="18" charset="0"/>
+              </a:rPr>
               <a:t>150 km</a:t>
             </a:r>
           </a:p>
         </p:txBody>
       </p:sp>
-    </p:spTree>
-    <p:extLst>
-      <p:ext uri="{BB962C8B-B14F-4D97-AF65-F5344CB8AC3E}">
-        <p14:creationId xmlns:p14="http://schemas.microsoft.com/office/powerpoint/2010/main" val="3476671789"/>
-      </p:ext>
-    </p:extLst>
-  </p:cSld>
-  <p:clrMapOvr>
-    <a:masterClrMapping/>
-  </p:clrMapOvr>
-</p:sld>
-</file>
-
-<file path=ppt/slides/slide3.xml><?xml version="1.0" encoding="utf-8"?>
-<p:sld xmlns:a="http://schemas.openxmlformats.org/drawingml/2006/main" xmlns:r="http://schemas.openxmlformats.org/officeDocument/2006/relationships" xmlns:p="http://schemas.openxmlformats.org/presentationml/2006/main">
-  <p:cSld>
-    <p:spTree>
-      <p:nvGrpSpPr>
-        <p:cNvPr id="1" name=""/>
-        <p:cNvGrpSpPr/>
-        <p:nvPr/>
-      </p:nvGrpSpPr>
-      <p:grpSpPr>
-        <a:xfrm>
-          <a:off x="0" y="0"/>
-          <a:ext cx="0" cy="0"/>
-          <a:chOff x="0" y="0"/>
-          <a:chExt cx="0" cy="0"/>
-        </a:xfrm>
-      </p:grpSpPr>
-      <p:sp>
-        <p:nvSpPr>
-          <p:cNvPr id="5" name="Rectangle 4">
-            <a:extLst>
-              <a:ext uri="{FF2B5EF4-FFF2-40B4-BE49-F238E27FC236}">
-                <a16:creationId xmlns:a16="http://schemas.microsoft.com/office/drawing/2014/main" id="{680190C6-54C5-CA4E-9B19-04413F929622}"/>
+      <p:sp>
+        <p:nvSpPr>
+          <p:cNvPr id="2" name="TextBox 1">
+            <a:extLst>
+              <a:ext uri="{FF2B5EF4-FFF2-40B4-BE49-F238E27FC236}">
+                <a16:creationId xmlns:a16="http://schemas.microsoft.com/office/drawing/2014/main" id="{9EA720F5-7B8D-EF46-A658-F4C4DB27B807}"/>
+              </a:ext>
+            </a:extLst>
+          </p:cNvPr>
+          <p:cNvSpPr txBox="1"/>
+          <p:nvPr/>
+        </p:nvSpPr>
+        <p:spPr>
+          <a:xfrm>
+            <a:off x="5919960" y="4657692"/>
+            <a:ext cx="1574028" cy="369332"/>
+          </a:xfrm>
+          <a:prstGeom prst="rect">
+            <a:avLst/>
+          </a:prstGeom>
+          <a:noFill/>
+        </p:spPr>
+        <p:txBody>
+          <a:bodyPr wrap="square" rtlCol="0">
+            <a:spAutoFit/>
+          </a:bodyPr>
+          <a:lstStyle/>
+          <a:p>
+            <a:r>
+              <a:rPr lang="en-CA" sz="900" dirty="0">
+                <a:solidFill>
+                  <a:srgbClr val="333333"/>
+                </a:solidFill>
+                <a:latin typeface="Times New Roman" panose="02020603050405020304" pitchFamily="18" charset="0"/>
+              </a:rPr>
+              <a:t>SWIFT CURRENT CREEK NEAR LEINAN</a:t>
+            </a:r>
+            <a:endParaRPr lang="en-US" sz="900" dirty="0">
+              <a:latin typeface="Times New Roman" panose="02020603050405020304" pitchFamily="18" charset="0"/>
+              <a:cs typeface="Times New Roman" panose="02020603050405020304" pitchFamily="18" charset="0"/>
+            </a:endParaRPr>
+          </a:p>
+        </p:txBody>
+      </p:sp>
+      <p:sp>
+        <p:nvSpPr>
+          <p:cNvPr id="3" name="Rectangle 2">
+            <a:extLst>
+              <a:ext uri="{FF2B5EF4-FFF2-40B4-BE49-F238E27FC236}">
+                <a16:creationId xmlns:a16="http://schemas.microsoft.com/office/drawing/2014/main" id="{10FB3063-8E0F-7A44-980A-35D62E769D54}"/>
               </a:ext>
             </a:extLst>
           </p:cNvPr>
@@ -6842,50 +7318,51 @@
         </p:nvSpPr>
         <p:spPr>
           <a:xfrm>
-            <a:off x="5339255" y="3195145"/>
-            <a:ext cx="4130566" cy="472965"/>
+            <a:off x="9648326" y="759255"/>
+            <a:ext cx="1716196" cy="369332"/>
           </a:xfrm>
           <a:prstGeom prst="rect">
             <a:avLst/>
           </a:prstGeom>
-          <a:solidFill>
-            <a:srgbClr val="00B0F0"/>
-          </a:solidFill>
-          <a:ln>
-            <a:noFill/>
-          </a:ln>
-        </p:spPr>
-        <p:style>
-          <a:lnRef idx="2">
-            <a:schemeClr val="accent1">
-              <a:shade val="50000"/>
-            </a:schemeClr>
-          </a:lnRef>
-          <a:fillRef idx="1">
-            <a:schemeClr val="accent1"/>
-          </a:fillRef>
-          <a:effectRef idx="0">
-            <a:schemeClr val="accent1"/>
-          </a:effectRef>
-          <a:fontRef idx="minor">
-            <a:schemeClr val="lt1"/>
-          </a:fontRef>
-        </p:style>
-        <p:txBody>
-          <a:bodyPr rtlCol="0" anchor="ctr"/>
-          <a:lstStyle/>
-          <a:p>
-            <a:pPr algn="ctr"/>
-            <a:endParaRPr lang="en-US"/>
-          </a:p>
-        </p:txBody>
-      </p:sp>
-      <p:sp>
-        <p:nvSpPr>
-          <p:cNvPr id="7" name="Rectangle 6">
-            <a:extLst>
-              <a:ext uri="{FF2B5EF4-FFF2-40B4-BE49-F238E27FC236}">
-                <a16:creationId xmlns:a16="http://schemas.microsoft.com/office/drawing/2014/main" id="{B807DDDD-A3CE-0045-9FAF-6446B581CF83}"/>
+        </p:spPr>
+        <p:txBody>
+          <a:bodyPr wrap="square">
+            <a:spAutoFit/>
+          </a:bodyPr>
+          <a:lstStyle/>
+          <a:p>
+            <a:pPr fontAlgn="t"/>
+            <a:r>
+              <a:rPr lang="en-CA" sz="900" dirty="0">
+                <a:solidFill>
+                  <a:srgbClr val="333333"/>
+                </a:solidFill>
+                <a:latin typeface="Times New Roman" panose="02020603050405020304" pitchFamily="18" charset="0"/>
+              </a:rPr>
+              <a:t>SOUTH SASKATCHEWAN</a:t>
+            </a:r>
+          </a:p>
+          <a:p>
+            <a:pPr fontAlgn="t"/>
+            <a:r>
+              <a:rPr lang="en-CA" sz="900" dirty="0">
+                <a:solidFill>
+                  <a:srgbClr val="333333"/>
+                </a:solidFill>
+                <a:latin typeface="Times New Roman" panose="02020603050405020304" pitchFamily="18" charset="0"/>
+              </a:rPr>
+              <a:t>RIVER AT SASKATOON</a:t>
+            </a:r>
+            <a:endParaRPr lang="en-CA" sz="900" dirty="0"/>
+          </a:p>
+        </p:txBody>
+      </p:sp>
+      <p:sp>
+        <p:nvSpPr>
+          <p:cNvPr id="4" name="Rectangle 3">
+            <a:extLst>
+              <a:ext uri="{FF2B5EF4-FFF2-40B4-BE49-F238E27FC236}">
+                <a16:creationId xmlns:a16="http://schemas.microsoft.com/office/drawing/2014/main" id="{A9723797-E9EB-CD45-81AA-DC709559B96A}"/>
               </a:ext>
             </a:extLst>
           </p:cNvPr>
@@ -6893,51 +7370,50 @@
           <p:nvPr/>
         </p:nvSpPr>
         <p:spPr>
-          <a:xfrm rot="16200000">
-            <a:off x="8787079" y="2512403"/>
-            <a:ext cx="892521" cy="472965"/>
+          <a:xfrm>
+            <a:off x="10158917" y="2020953"/>
+            <a:ext cx="1322798" cy="369332"/>
           </a:xfrm>
           <a:prstGeom prst="rect">
             <a:avLst/>
           </a:prstGeom>
-          <a:solidFill>
-            <a:srgbClr val="00B0F0"/>
-          </a:solidFill>
-          <a:ln>
-            <a:noFill/>
-          </a:ln>
-        </p:spPr>
-        <p:style>
-          <a:lnRef idx="2">
-            <a:schemeClr val="accent1">
-              <a:shade val="50000"/>
-            </a:schemeClr>
-          </a:lnRef>
-          <a:fillRef idx="1">
-            <a:schemeClr val="accent1"/>
-          </a:fillRef>
-          <a:effectRef idx="0">
-            <a:schemeClr val="accent1"/>
-          </a:effectRef>
-          <a:fontRef idx="minor">
-            <a:schemeClr val="lt1"/>
-          </a:fontRef>
-        </p:style>
-        <p:txBody>
-          <a:bodyPr rtlCol="0" anchor="ctr"/>
-          <a:lstStyle/>
-          <a:p>
-            <a:pPr algn="ctr"/>
-            <a:endParaRPr lang="en-US"/>
-          </a:p>
-        </p:txBody>
-      </p:sp>
-      <p:sp>
-        <p:nvSpPr>
-          <p:cNvPr id="8" name="Rectangle 7">
-            <a:extLst>
-              <a:ext uri="{FF2B5EF4-FFF2-40B4-BE49-F238E27FC236}">
-                <a16:creationId xmlns:a16="http://schemas.microsoft.com/office/drawing/2014/main" id="{BC8B7C9E-F377-DF45-B45C-A3DA16B77E74}"/>
+        </p:spPr>
+        <p:txBody>
+          <a:bodyPr wrap="none">
+            <a:spAutoFit/>
+          </a:bodyPr>
+          <a:lstStyle/>
+          <a:p>
+            <a:r>
+              <a:rPr lang="en-CA" sz="900" dirty="0">
+                <a:solidFill>
+                  <a:srgbClr val="333333"/>
+                </a:solidFill>
+                <a:latin typeface="Times New Roman" panose="02020603050405020304" pitchFamily="18" charset="0"/>
+              </a:rPr>
+              <a:t>LAKE DIEFENBAKER</a:t>
+            </a:r>
+          </a:p>
+          <a:p>
+            <a:r>
+              <a:rPr lang="en-CA" sz="900" dirty="0">
+                <a:solidFill>
+                  <a:srgbClr val="333333"/>
+                </a:solidFill>
+                <a:latin typeface="Times New Roman" panose="02020603050405020304" pitchFamily="18" charset="0"/>
+              </a:rPr>
+              <a:t>AT GARDINER DAM</a:t>
+            </a:r>
+            <a:endParaRPr lang="en-CA" sz="900" dirty="0"/>
+          </a:p>
+        </p:txBody>
+      </p:sp>
+      <p:sp>
+        <p:nvSpPr>
+          <p:cNvPr id="6" name="Rectangle 5">
+            <a:extLst>
+              <a:ext uri="{FF2B5EF4-FFF2-40B4-BE49-F238E27FC236}">
+                <a16:creationId xmlns:a16="http://schemas.microsoft.com/office/drawing/2014/main" id="{53A889D2-9535-A343-AA04-E10224896AFB}"/>
               </a:ext>
             </a:extLst>
           </p:cNvPr>
@@ -6945,72 +7421,181 @@
           <p:nvPr/>
         </p:nvSpPr>
         <p:spPr>
-          <a:xfrm rot="16200000">
-            <a:off x="9143284" y="3713447"/>
-            <a:ext cx="377130" cy="275946"/>
+          <a:xfrm>
+            <a:off x="9718856" y="4386768"/>
+            <a:ext cx="1245854" cy="507831"/>
           </a:xfrm>
           <a:prstGeom prst="rect">
             <a:avLst/>
           </a:prstGeom>
-          <a:solidFill>
-            <a:srgbClr val="00B0F0"/>
-          </a:solidFill>
-          <a:ln>
-            <a:noFill/>
-          </a:ln>
-        </p:spPr>
-        <p:style>
-          <a:lnRef idx="2">
-            <a:schemeClr val="accent1">
-              <a:shade val="50000"/>
-            </a:schemeClr>
-          </a:lnRef>
-          <a:fillRef idx="1">
-            <a:schemeClr val="accent1"/>
-          </a:fillRef>
-          <a:effectRef idx="0">
-            <a:schemeClr val="accent1"/>
-          </a:effectRef>
-          <a:fontRef idx="minor">
-            <a:schemeClr val="lt1"/>
-          </a:fontRef>
-        </p:style>
-        <p:txBody>
-          <a:bodyPr rtlCol="0" anchor="ctr"/>
-          <a:lstStyle/>
-          <a:p>
-            <a:pPr algn="ctr"/>
-            <a:endParaRPr lang="en-US"/>
+        </p:spPr>
+        <p:txBody>
+          <a:bodyPr wrap="none">
+            <a:spAutoFit/>
+          </a:bodyPr>
+          <a:lstStyle/>
+          <a:p>
+            <a:r>
+              <a:rPr lang="en-CA" sz="900" dirty="0">
+                <a:solidFill>
+                  <a:srgbClr val="333333"/>
+                </a:solidFill>
+                <a:latin typeface="Times New Roman" panose="02020603050405020304" pitchFamily="18" charset="0"/>
+              </a:rPr>
+              <a:t>ELBOW DIVERSION</a:t>
+            </a:r>
+          </a:p>
+          <a:p>
+            <a:r>
+              <a:rPr lang="en-CA" sz="900" dirty="0">
+                <a:solidFill>
+                  <a:srgbClr val="333333"/>
+                </a:solidFill>
+                <a:latin typeface="Times New Roman" panose="02020603050405020304" pitchFamily="18" charset="0"/>
+              </a:rPr>
+              <a:t>CANAL AT DROP</a:t>
+            </a:r>
+          </a:p>
+          <a:p>
+            <a:r>
+              <a:rPr lang="en-CA" sz="900" dirty="0">
+                <a:solidFill>
+                  <a:srgbClr val="333333"/>
+                </a:solidFill>
+                <a:latin typeface="Times New Roman" panose="02020603050405020304" pitchFamily="18" charset="0"/>
+              </a:rPr>
+              <a:t>STRUCTURE</a:t>
+            </a:r>
+            <a:endParaRPr lang="en-CA" sz="900" dirty="0"/>
+          </a:p>
+        </p:txBody>
+      </p:sp>
+      <p:sp>
+        <p:nvSpPr>
+          <p:cNvPr id="9" name="Rectangle 8">
+            <a:extLst>
+              <a:ext uri="{FF2B5EF4-FFF2-40B4-BE49-F238E27FC236}">
+                <a16:creationId xmlns:a16="http://schemas.microsoft.com/office/drawing/2014/main" id="{D75CC4CA-CBEC-5842-ABE1-FA2E0BE5884D}"/>
+              </a:ext>
+            </a:extLst>
+          </p:cNvPr>
+          <p:cNvSpPr/>
+          <p:nvPr/>
+        </p:nvSpPr>
+        <p:spPr>
+          <a:xfrm>
+            <a:off x="1651651" y="2718790"/>
+            <a:ext cx="1120820" cy="369332"/>
+          </a:xfrm>
+          <a:prstGeom prst="rect">
+            <a:avLst/>
+          </a:prstGeom>
+        </p:spPr>
+        <p:txBody>
+          <a:bodyPr wrap="none">
+            <a:spAutoFit/>
+          </a:bodyPr>
+          <a:lstStyle/>
+          <a:p>
+            <a:r>
+              <a:rPr lang="en-CA" sz="900" dirty="0">
+                <a:solidFill>
+                  <a:srgbClr val="333333"/>
+                </a:solidFill>
+                <a:latin typeface="Times New Roman" panose="02020603050405020304" pitchFamily="18" charset="0"/>
+              </a:rPr>
+              <a:t>RED DEER RIVER</a:t>
+            </a:r>
+          </a:p>
+          <a:p>
+            <a:r>
+              <a:rPr lang="en-CA" sz="900" dirty="0">
+                <a:solidFill>
+                  <a:srgbClr val="333333"/>
+                </a:solidFill>
+                <a:latin typeface="Times New Roman" panose="02020603050405020304" pitchFamily="18" charset="0"/>
+              </a:rPr>
+              <a:t>NEAR BINDLOSS</a:t>
+            </a:r>
+            <a:endParaRPr lang="en-CA" sz="900" dirty="0"/>
+          </a:p>
+        </p:txBody>
+      </p:sp>
+      <p:sp>
+        <p:nvSpPr>
+          <p:cNvPr id="12" name="Rectangle 11">
+            <a:extLst>
+              <a:ext uri="{FF2B5EF4-FFF2-40B4-BE49-F238E27FC236}">
+                <a16:creationId xmlns:a16="http://schemas.microsoft.com/office/drawing/2014/main" id="{C2724449-ED7D-8A40-8CFD-F4411909C49C}"/>
+              </a:ext>
+            </a:extLst>
+          </p:cNvPr>
+          <p:cNvSpPr/>
+          <p:nvPr/>
+        </p:nvSpPr>
+        <p:spPr>
+          <a:xfrm>
+            <a:off x="1661390" y="4523656"/>
+            <a:ext cx="1618591" cy="369332"/>
+          </a:xfrm>
+          <a:prstGeom prst="rect">
+            <a:avLst/>
+          </a:prstGeom>
+        </p:spPr>
+        <p:txBody>
+          <a:bodyPr wrap="square">
+            <a:spAutoFit/>
+          </a:bodyPr>
+          <a:lstStyle/>
+          <a:p>
+            <a:pPr fontAlgn="t"/>
+            <a:r>
+              <a:rPr lang="en-CA" sz="900" dirty="0">
+                <a:solidFill>
+                  <a:srgbClr val="333333"/>
+                </a:solidFill>
+                <a:latin typeface="Times New Roman" panose="02020603050405020304" pitchFamily="18" charset="0"/>
+              </a:rPr>
+              <a:t>SOUTH SASKATCHEWAN</a:t>
+            </a:r>
+          </a:p>
+          <a:p>
+            <a:pPr fontAlgn="t"/>
+            <a:r>
+              <a:rPr lang="en-CA" sz="900" dirty="0">
+                <a:solidFill>
+                  <a:srgbClr val="333333"/>
+                </a:solidFill>
+                <a:latin typeface="Times New Roman" panose="02020603050405020304" pitchFamily="18" charset="0"/>
+              </a:rPr>
+              <a:t>RIVER AT MEDICINE HAT</a:t>
+            </a:r>
+            <a:endParaRPr lang="en-CA" sz="900" dirty="0"/>
           </a:p>
         </p:txBody>
       </p:sp>
       <p:cxnSp>
         <p:nvCxnSpPr>
-          <p:cNvPr id="10" name="Straight Connector 9">
-            <a:extLst>
-              <a:ext uri="{FF2B5EF4-FFF2-40B4-BE49-F238E27FC236}">
-                <a16:creationId xmlns:a16="http://schemas.microsoft.com/office/drawing/2014/main" id="{7EBBA694-E4BC-1D47-95FE-55E46FDB62BC}"/>
-              </a:ext>
-            </a:extLst>
-          </p:cNvPr>
-          <p:cNvCxnSpPr>
-            <a:cxnSpLocks/>
-          </p:cNvCxnSpPr>
+          <p:cNvPr id="16" name="Straight Arrow Connector 15">
+            <a:extLst>
+              <a:ext uri="{FF2B5EF4-FFF2-40B4-BE49-F238E27FC236}">
+                <a16:creationId xmlns:a16="http://schemas.microsoft.com/office/drawing/2014/main" id="{A806AEA7-430F-C742-8349-D15C084CCAE0}"/>
+              </a:ext>
+            </a:extLst>
+          </p:cNvPr>
+          <p:cNvCxnSpPr/>
           <p:nvPr/>
         </p:nvCxnSpPr>
         <p:spPr>
           <a:xfrm>
-            <a:off x="2680138" y="4803228"/>
-            <a:ext cx="1707931" cy="0"/>
-          </a:xfrm>
-          <a:prstGeom prst="line">
-            <a:avLst/>
-          </a:prstGeom>
-          <a:ln w="38100">
-            <a:solidFill>
-              <a:schemeClr val="accent1"/>
-            </a:solidFill>
-            <a:headEnd type="oval" w="lg" len="lg"/>
+            <a:off x="3537857" y="2718790"/>
+            <a:ext cx="544286" cy="0"/>
+          </a:xfrm>
+          <a:prstGeom prst="straightConnector1">
+            <a:avLst/>
+          </a:prstGeom>
+          <a:ln>
+            <a:tailEnd type="triangle"/>
           </a:ln>
         </p:spPr>
         <p:style>
@@ -7030,30 +7615,26 @@
       </p:cxnSp>
       <p:cxnSp>
         <p:nvCxnSpPr>
-          <p:cNvPr id="11" name="Straight Connector 10">
-            <a:extLst>
-              <a:ext uri="{FF2B5EF4-FFF2-40B4-BE49-F238E27FC236}">
-                <a16:creationId xmlns:a16="http://schemas.microsoft.com/office/drawing/2014/main" id="{F7972405-D3F2-BE4E-904A-27FDED3182B6}"/>
-              </a:ext>
-            </a:extLst>
-          </p:cNvPr>
-          <p:cNvCxnSpPr>
-            <a:cxnSpLocks/>
-          </p:cNvCxnSpPr>
+          <p:cNvPr id="53" name="Straight Arrow Connector 52">
+            <a:extLst>
+              <a:ext uri="{FF2B5EF4-FFF2-40B4-BE49-F238E27FC236}">
+                <a16:creationId xmlns:a16="http://schemas.microsoft.com/office/drawing/2014/main" id="{A5298F4F-B051-4446-8F3E-B4043518B63A}"/>
+              </a:ext>
+            </a:extLst>
+          </p:cNvPr>
+          <p:cNvCxnSpPr/>
           <p:nvPr/>
         </p:nvCxnSpPr>
         <p:spPr>
           <a:xfrm>
-            <a:off x="4388069" y="3429000"/>
-            <a:ext cx="0" cy="1374228"/>
-          </a:xfrm>
-          <a:prstGeom prst="line">
-            <a:avLst/>
-          </a:prstGeom>
-          <a:ln w="38100">
-            <a:solidFill>
-              <a:schemeClr val="accent1"/>
-            </a:solidFill>
+            <a:off x="3396343" y="4477475"/>
+            <a:ext cx="544286" cy="0"/>
+          </a:xfrm>
+          <a:prstGeom prst="straightConnector1">
+            <a:avLst/>
+          </a:prstGeom>
+          <a:ln>
+            <a:tailEnd type="triangle"/>
           </a:ln>
         </p:spPr>
         <p:style>
@@ -7073,31 +7654,28 @@
       </p:cxnSp>
       <p:cxnSp>
         <p:nvCxnSpPr>
-          <p:cNvPr id="15" name="Straight Connector 14">
-            <a:extLst>
-              <a:ext uri="{FF2B5EF4-FFF2-40B4-BE49-F238E27FC236}">
-                <a16:creationId xmlns:a16="http://schemas.microsoft.com/office/drawing/2014/main" id="{834AEE9F-5120-C24A-87DD-835C6B14B7A7}"/>
+          <p:cNvPr id="54" name="Straight Arrow Connector 53">
+            <a:extLst>
+              <a:ext uri="{FF2B5EF4-FFF2-40B4-BE49-F238E27FC236}">
+                <a16:creationId xmlns:a16="http://schemas.microsoft.com/office/drawing/2014/main" id="{8F86E4D8-D157-2742-86D6-E9D36A6FA3D7}"/>
               </a:ext>
             </a:extLst>
           </p:cNvPr>
           <p:cNvCxnSpPr>
             <a:cxnSpLocks/>
-            <a:endCxn id="5" idx="1"/>
           </p:cNvCxnSpPr>
           <p:nvPr/>
         </p:nvCxnSpPr>
         <p:spPr>
-          <a:xfrm>
-            <a:off x="4388069" y="3429000"/>
-            <a:ext cx="951186" cy="2628"/>
-          </a:xfrm>
-          <a:prstGeom prst="line">
-            <a:avLst/>
-          </a:prstGeom>
-          <a:ln w="38100">
-            <a:solidFill>
-              <a:schemeClr val="accent1"/>
-            </a:solidFill>
+          <a:xfrm flipV="1">
+            <a:off x="6291944" y="3765539"/>
+            <a:ext cx="0" cy="394750"/>
+          </a:xfrm>
+          <a:prstGeom prst="straightConnector1">
+            <a:avLst/>
+          </a:prstGeom>
+          <a:ln>
+            <a:tailEnd type="triangle"/>
           </a:ln>
         </p:spPr>
         <p:style>
@@ -7117,10 +7695,10 @@
       </p:cxnSp>
       <p:cxnSp>
         <p:nvCxnSpPr>
-          <p:cNvPr id="18" name="Straight Connector 17">
-            <a:extLst>
-              <a:ext uri="{FF2B5EF4-FFF2-40B4-BE49-F238E27FC236}">
-                <a16:creationId xmlns:a16="http://schemas.microsoft.com/office/drawing/2014/main" id="{3CBB9A3C-C665-FA48-AB9D-9B1A35A49F7C}"/>
+          <p:cNvPr id="57" name="Straight Arrow Connector 56">
+            <a:extLst>
+              <a:ext uri="{FF2B5EF4-FFF2-40B4-BE49-F238E27FC236}">
+                <a16:creationId xmlns:a16="http://schemas.microsoft.com/office/drawing/2014/main" id="{59C2733A-B94B-0640-8904-AC73681A9FB7}"/>
               </a:ext>
             </a:extLst>
           </p:cNvPr>
@@ -7130,18 +7708,15 @@
           <p:nvPr/>
         </p:nvCxnSpPr>
         <p:spPr>
-          <a:xfrm>
-            <a:off x="2680138" y="2580290"/>
-            <a:ext cx="2112579" cy="0"/>
-          </a:xfrm>
-          <a:prstGeom prst="line">
-            <a:avLst/>
-          </a:prstGeom>
-          <a:ln w="38100">
-            <a:solidFill>
-              <a:srgbClr val="FFC000"/>
-            </a:solidFill>
-            <a:headEnd type="oval" w="lg" len="lg"/>
+          <a:xfrm flipV="1">
+            <a:off x="9089572" y="1502330"/>
+            <a:ext cx="0" cy="394750"/>
+          </a:xfrm>
+          <a:prstGeom prst="straightConnector1">
+            <a:avLst/>
+          </a:prstGeom>
+          <a:ln>
+            <a:tailEnd type="triangle"/>
           </a:ln>
         </p:spPr>
         <p:style>
@@ -7161,10 +7736,10 @@
       </p:cxnSp>
       <p:cxnSp>
         <p:nvCxnSpPr>
-          <p:cNvPr id="20" name="Straight Connector 19">
-            <a:extLst>
-              <a:ext uri="{FF2B5EF4-FFF2-40B4-BE49-F238E27FC236}">
-                <a16:creationId xmlns:a16="http://schemas.microsoft.com/office/drawing/2014/main" id="{EB5C3835-88F6-0944-803B-8E1339DBF9F4}"/>
+          <p:cNvPr id="58" name="Straight Arrow Connector 57">
+            <a:extLst>
+              <a:ext uri="{FF2B5EF4-FFF2-40B4-BE49-F238E27FC236}">
+                <a16:creationId xmlns:a16="http://schemas.microsoft.com/office/drawing/2014/main" id="{42F44F33-1947-314A-A6FC-31CCE3532AF6}"/>
               </a:ext>
             </a:extLst>
           </p:cNvPr>
@@ -7174,17 +7749,15 @@
           <p:nvPr/>
         </p:nvCxnSpPr>
         <p:spPr>
-          <a:xfrm flipV="1">
-            <a:off x="4792717" y="2580290"/>
-            <a:ext cx="0" cy="848710"/>
-          </a:xfrm>
-          <a:prstGeom prst="line">
-            <a:avLst/>
-          </a:prstGeom>
-          <a:ln w="38100">
-            <a:solidFill>
-              <a:srgbClr val="FFC000"/>
-            </a:solidFill>
+          <a:xfrm>
+            <a:off x="9058575" y="3985063"/>
+            <a:ext cx="1" cy="369332"/>
+          </a:xfrm>
+          <a:prstGeom prst="straightConnector1">
+            <a:avLst/>
+          </a:prstGeom>
+          <a:ln>
+            <a:tailEnd type="triangle"/>
           </a:ln>
         </p:spPr>
         <p:style>
@@ -7202,100 +7775,12 @@
           </a:fontRef>
         </p:style>
       </p:cxnSp>
-      <p:cxnSp>
-        <p:nvCxnSpPr>
-          <p:cNvPr id="24" name="Straight Connector 23">
-            <a:extLst>
-              <a:ext uri="{FF2B5EF4-FFF2-40B4-BE49-F238E27FC236}">
-                <a16:creationId xmlns:a16="http://schemas.microsoft.com/office/drawing/2014/main" id="{6921A1AF-0828-D443-8E23-48A21CBB6EA5}"/>
-              </a:ext>
-            </a:extLst>
-          </p:cNvPr>
-          <p:cNvCxnSpPr>
-            <a:cxnSpLocks/>
-          </p:cNvCxnSpPr>
-          <p:nvPr/>
-        </p:nvCxnSpPr>
-        <p:spPr>
-          <a:xfrm flipV="1">
-            <a:off x="6448096" y="3662855"/>
-            <a:ext cx="0" cy="656897"/>
-          </a:xfrm>
-          <a:prstGeom prst="line">
-            <a:avLst/>
-          </a:prstGeom>
-          <a:ln w="38100">
-            <a:solidFill>
-              <a:srgbClr val="00B050"/>
-            </a:solidFill>
-            <a:headEnd type="oval" w="lg" len="lg"/>
-          </a:ln>
-        </p:spPr>
-        <p:style>
-          <a:lnRef idx="1">
-            <a:schemeClr val="accent1"/>
-          </a:lnRef>
-          <a:fillRef idx="0">
-            <a:schemeClr val="accent1"/>
-          </a:fillRef>
-          <a:effectRef idx="0">
-            <a:schemeClr val="accent1"/>
-          </a:effectRef>
-          <a:fontRef idx="minor">
-            <a:schemeClr val="tx1"/>
-          </a:fontRef>
-        </p:style>
-      </p:cxnSp>
-      <p:cxnSp>
-        <p:nvCxnSpPr>
-          <p:cNvPr id="25" name="Straight Connector 24">
-            <a:extLst>
-              <a:ext uri="{FF2B5EF4-FFF2-40B4-BE49-F238E27FC236}">
-                <a16:creationId xmlns:a16="http://schemas.microsoft.com/office/drawing/2014/main" id="{3688A973-3119-1B46-AC56-96D5E3ECC179}"/>
-              </a:ext>
-            </a:extLst>
-          </p:cNvPr>
-          <p:cNvCxnSpPr>
-            <a:cxnSpLocks/>
-          </p:cNvCxnSpPr>
-          <p:nvPr/>
-        </p:nvCxnSpPr>
-        <p:spPr>
-          <a:xfrm flipV="1">
-            <a:off x="9333186" y="4039985"/>
-            <a:ext cx="0" cy="279767"/>
-          </a:xfrm>
-          <a:prstGeom prst="line">
-            <a:avLst/>
-          </a:prstGeom>
-          <a:ln w="38100">
-            <a:solidFill>
-              <a:srgbClr val="FF0000"/>
-            </a:solidFill>
-            <a:headEnd type="oval" w="lg" len="lg"/>
-          </a:ln>
-        </p:spPr>
-        <p:style>
-          <a:lnRef idx="1">
-            <a:schemeClr val="accent1"/>
-          </a:lnRef>
-          <a:fillRef idx="0">
-            <a:schemeClr val="accent1"/>
-          </a:fillRef>
-          <a:effectRef idx="0">
-            <a:schemeClr val="accent1"/>
-          </a:effectRef>
-          <a:fontRef idx="minor">
-            <a:schemeClr val="tx1"/>
-          </a:fontRef>
-        </p:style>
-      </p:cxnSp>
-      <p:sp>
-        <p:nvSpPr>
-          <p:cNvPr id="29" name="TextBox 28">
-            <a:extLst>
-              <a:ext uri="{FF2B5EF4-FFF2-40B4-BE49-F238E27FC236}">
-                <a16:creationId xmlns:a16="http://schemas.microsoft.com/office/drawing/2014/main" id="{EB34EADA-61BC-2849-A749-8AD6CB99ADDB}"/>
+      <p:sp>
+        <p:nvSpPr>
+          <p:cNvPr id="13" name="TextBox 12">
+            <a:extLst>
+              <a:ext uri="{FF2B5EF4-FFF2-40B4-BE49-F238E27FC236}">
+                <a16:creationId xmlns:a16="http://schemas.microsoft.com/office/drawing/2014/main" id="{9F090C00-1D87-A11F-60C1-901FB068C1D6}"/>
               </a:ext>
             </a:extLst>
           </p:cNvPr>
@@ -7304,8 +7789,8 @@
         </p:nvSpPr>
         <p:spPr>
           <a:xfrm>
-            <a:off x="1602821" y="2395624"/>
-            <a:ext cx="1345312" cy="369332"/>
+            <a:off x="3396343" y="2186153"/>
+            <a:ext cx="370114" cy="373498"/>
           </a:xfrm>
           <a:prstGeom prst="rect">
             <a:avLst/>
@@ -7319,21 +7804,18 @@
           <a:lstStyle/>
           <a:p>
             <a:r>
-              <a:rPr lang="en-US" dirty="0">
-                <a:latin typeface="Times New Roman" panose="02020603050405020304" pitchFamily="18" charset="0"/>
-                <a:cs typeface="Times New Roman" panose="02020603050405020304" pitchFamily="18" charset="0"/>
-              </a:rPr>
-              <a:t>05CK004</a:t>
-            </a:r>
-          </a:p>
-        </p:txBody>
-      </p:sp>
-      <p:sp>
-        <p:nvSpPr>
-          <p:cNvPr id="30" name="TextBox 29">
-            <a:extLst>
-              <a:ext uri="{FF2B5EF4-FFF2-40B4-BE49-F238E27FC236}">
-                <a16:creationId xmlns:a16="http://schemas.microsoft.com/office/drawing/2014/main" id="{09B1A190-A80A-6145-89C0-63C1EA38A208}"/>
+              <a:rPr lang="en-US" dirty="0"/>
+              <a:t>1</a:t>
+            </a:r>
+          </a:p>
+        </p:txBody>
+      </p:sp>
+      <p:sp>
+        <p:nvSpPr>
+          <p:cNvPr id="14" name="TextBox 13">
+            <a:extLst>
+              <a:ext uri="{FF2B5EF4-FFF2-40B4-BE49-F238E27FC236}">
+                <a16:creationId xmlns:a16="http://schemas.microsoft.com/office/drawing/2014/main" id="{A7086E48-81F9-A5F8-6999-FF8F4122F47B}"/>
               </a:ext>
             </a:extLst>
           </p:cNvPr>
@@ -7342,8 +7824,8 @@
         </p:nvSpPr>
         <p:spPr>
           <a:xfrm>
-            <a:off x="1602821" y="4618562"/>
-            <a:ext cx="1345312" cy="369332"/>
+            <a:off x="3156407" y="3911541"/>
+            <a:ext cx="370114" cy="369332"/>
           </a:xfrm>
           <a:prstGeom prst="rect">
             <a:avLst/>
@@ -7357,21 +7839,18 @@
           <a:lstStyle/>
           <a:p>
             <a:r>
-              <a:rPr lang="en-US" dirty="0">
-                <a:latin typeface="Times New Roman" panose="02020603050405020304" pitchFamily="18" charset="0"/>
-                <a:cs typeface="Times New Roman" panose="02020603050405020304" pitchFamily="18" charset="0"/>
-              </a:rPr>
-              <a:t>05AJ001</a:t>
-            </a:r>
-          </a:p>
-        </p:txBody>
-      </p:sp>
-      <p:sp>
-        <p:nvSpPr>
-          <p:cNvPr id="31" name="TextBox 30">
-            <a:extLst>
-              <a:ext uri="{FF2B5EF4-FFF2-40B4-BE49-F238E27FC236}">
-                <a16:creationId xmlns:a16="http://schemas.microsoft.com/office/drawing/2014/main" id="{65896081-34CB-D349-B1D4-E0181A78F168}"/>
+              <a:rPr lang="en-US" dirty="0"/>
+              <a:t>2</a:t>
+            </a:r>
+          </a:p>
+        </p:txBody>
+      </p:sp>
+      <p:sp>
+        <p:nvSpPr>
+          <p:cNvPr id="17" name="TextBox 16">
+            <a:extLst>
+              <a:ext uri="{FF2B5EF4-FFF2-40B4-BE49-F238E27FC236}">
+                <a16:creationId xmlns:a16="http://schemas.microsoft.com/office/drawing/2014/main" id="{EB2394EA-82FB-CD75-BC21-99188CA6E90E}"/>
               </a:ext>
             </a:extLst>
           </p:cNvPr>
@@ -7380,8 +7859,8 @@
         </p:nvSpPr>
         <p:spPr>
           <a:xfrm>
-            <a:off x="5891067" y="4347498"/>
-            <a:ext cx="1345312" cy="369332"/>
+            <a:off x="4928018" y="3385877"/>
+            <a:ext cx="370114" cy="369332"/>
           </a:xfrm>
           <a:prstGeom prst="rect">
             <a:avLst/>
@@ -7395,21 +7874,18 @@
           <a:lstStyle/>
           <a:p>
             <a:r>
-              <a:rPr lang="en-US" dirty="0">
-                <a:latin typeface="Times New Roman" panose="02020603050405020304" pitchFamily="18" charset="0"/>
-                <a:cs typeface="Times New Roman" panose="02020603050405020304" pitchFamily="18" charset="0"/>
-              </a:rPr>
-              <a:t>05HD039</a:t>
-            </a:r>
-          </a:p>
-        </p:txBody>
-      </p:sp>
-      <p:sp>
-        <p:nvSpPr>
-          <p:cNvPr id="32" name="TextBox 31">
-            <a:extLst>
-              <a:ext uri="{FF2B5EF4-FFF2-40B4-BE49-F238E27FC236}">
-                <a16:creationId xmlns:a16="http://schemas.microsoft.com/office/drawing/2014/main" id="{A5227924-2173-AF48-AE27-7D00249BF555}"/>
+              <a:rPr lang="en-US" dirty="0"/>
+              <a:t>3</a:t>
+            </a:r>
+          </a:p>
+        </p:txBody>
+      </p:sp>
+      <p:sp>
+        <p:nvSpPr>
+          <p:cNvPr id="19" name="TextBox 18">
+            <a:extLst>
+              <a:ext uri="{FF2B5EF4-FFF2-40B4-BE49-F238E27FC236}">
+                <a16:creationId xmlns:a16="http://schemas.microsoft.com/office/drawing/2014/main" id="{B094BA4D-8A89-AE36-E4CF-E09F9D1963F3}"/>
               </a:ext>
             </a:extLst>
           </p:cNvPr>
@@ -7418,8 +7894,8 @@
         </p:nvSpPr>
         <p:spPr>
           <a:xfrm>
-            <a:off x="8797165" y="4347498"/>
-            <a:ext cx="1345312" cy="369332"/>
+            <a:off x="5925505" y="3799648"/>
+            <a:ext cx="370114" cy="369332"/>
           </a:xfrm>
           <a:prstGeom prst="rect">
             <a:avLst/>
@@ -7433,21 +7909,18 @@
           <a:lstStyle/>
           <a:p>
             <a:r>
-              <a:rPr lang="en-US" dirty="0">
-                <a:latin typeface="Times New Roman" panose="02020603050405020304" pitchFamily="18" charset="0"/>
-                <a:cs typeface="Times New Roman" panose="02020603050405020304" pitchFamily="18" charset="0"/>
-              </a:rPr>
-              <a:t>05JG006</a:t>
-            </a:r>
-          </a:p>
-        </p:txBody>
-      </p:sp>
-      <p:sp>
-        <p:nvSpPr>
-          <p:cNvPr id="33" name="TextBox 32">
-            <a:extLst>
-              <a:ext uri="{FF2B5EF4-FFF2-40B4-BE49-F238E27FC236}">
-                <a16:creationId xmlns:a16="http://schemas.microsoft.com/office/drawing/2014/main" id="{7D11F1CD-F745-0E4A-9F40-CAEC63F0273A}"/>
+              <a:rPr lang="en-US" dirty="0"/>
+              <a:t>4</a:t>
+            </a:r>
+          </a:p>
+        </p:txBody>
+      </p:sp>
+      <p:sp>
+        <p:nvSpPr>
+          <p:cNvPr id="21" name="TextBox 20">
+            <a:extLst>
+              <a:ext uri="{FF2B5EF4-FFF2-40B4-BE49-F238E27FC236}">
+                <a16:creationId xmlns:a16="http://schemas.microsoft.com/office/drawing/2014/main" id="{C1AEDFF1-4290-4700-13E1-AB0798A8C701}"/>
               </a:ext>
             </a:extLst>
           </p:cNvPr>
@@ -7456,8 +7929,8 @@
         </p:nvSpPr>
         <p:spPr>
           <a:xfrm>
-            <a:off x="8659193" y="735412"/>
-            <a:ext cx="1345312" cy="369332"/>
+            <a:off x="8692464" y="1501932"/>
+            <a:ext cx="370114" cy="369332"/>
           </a:xfrm>
           <a:prstGeom prst="rect">
             <a:avLst/>
@@ -7471,21 +7944,18 @@
           <a:lstStyle/>
           <a:p>
             <a:r>
-              <a:rPr lang="en-US" dirty="0">
-                <a:latin typeface="Times New Roman" panose="02020603050405020304" pitchFamily="18" charset="0"/>
-                <a:cs typeface="Times New Roman" panose="02020603050405020304" pitchFamily="18" charset="0"/>
-              </a:rPr>
-              <a:t>05HG001</a:t>
-            </a:r>
-          </a:p>
-        </p:txBody>
-      </p:sp>
-      <p:sp>
-        <p:nvSpPr>
-          <p:cNvPr id="34" name="TextBox 33">
-            <a:extLst>
-              <a:ext uri="{FF2B5EF4-FFF2-40B4-BE49-F238E27FC236}">
-                <a16:creationId xmlns:a16="http://schemas.microsoft.com/office/drawing/2014/main" id="{0ECE1BD5-BBDA-134A-93FC-89978810C374}"/>
+              <a:rPr lang="en-US" dirty="0"/>
+              <a:t>7</a:t>
+            </a:r>
+          </a:p>
+        </p:txBody>
+      </p:sp>
+      <p:sp>
+        <p:nvSpPr>
+          <p:cNvPr id="22" name="TextBox 21">
+            <a:extLst>
+              <a:ext uri="{FF2B5EF4-FFF2-40B4-BE49-F238E27FC236}">
+                <a16:creationId xmlns:a16="http://schemas.microsoft.com/office/drawing/2014/main" id="{1D40983A-1197-B1C9-6F04-9C4B559EA06B}"/>
               </a:ext>
             </a:extLst>
           </p:cNvPr>
@@ -7494,8 +7964,8 @@
         </p:nvSpPr>
         <p:spPr>
           <a:xfrm>
-            <a:off x="9258278" y="1969881"/>
-            <a:ext cx="1345312" cy="369332"/>
+            <a:off x="5723618" y="2764956"/>
+            <a:ext cx="370114" cy="369332"/>
           </a:xfrm>
           <a:prstGeom prst="rect">
             <a:avLst/>
@@ -7509,21 +7979,18 @@
           <a:lstStyle/>
           <a:p>
             <a:r>
-              <a:rPr lang="en-US" dirty="0">
-                <a:latin typeface="Times New Roman" panose="02020603050405020304" pitchFamily="18" charset="0"/>
-                <a:cs typeface="Times New Roman" panose="02020603050405020304" pitchFamily="18" charset="0"/>
-              </a:rPr>
-              <a:t>05HF003</a:t>
-            </a:r>
-          </a:p>
-        </p:txBody>
-      </p:sp>
-      <p:sp>
-        <p:nvSpPr>
-          <p:cNvPr id="35" name="TextBox 34">
-            <a:extLst>
-              <a:ext uri="{FF2B5EF4-FFF2-40B4-BE49-F238E27FC236}">
-                <a16:creationId xmlns:a16="http://schemas.microsoft.com/office/drawing/2014/main" id="{743C1418-8866-2546-9421-BAC316F6165A}"/>
+              <a:rPr lang="en-US" dirty="0"/>
+              <a:t>5</a:t>
+            </a:r>
+          </a:p>
+        </p:txBody>
+      </p:sp>
+      <p:sp>
+        <p:nvSpPr>
+          <p:cNvPr id="26" name="TextBox 25">
+            <a:extLst>
+              <a:ext uri="{FF2B5EF4-FFF2-40B4-BE49-F238E27FC236}">
+                <a16:creationId xmlns:a16="http://schemas.microsoft.com/office/drawing/2014/main" id="{7A8692E3-0A6F-92F7-692E-A4F506E2E7BE}"/>
               </a:ext>
             </a:extLst>
           </p:cNvPr>
@@ -7532,8 +7999,8 @@
         </p:nvSpPr>
         <p:spPr>
           <a:xfrm>
-            <a:off x="6861920" y="3209770"/>
-            <a:ext cx="1935239" cy="369332"/>
+            <a:off x="8025435" y="2784021"/>
+            <a:ext cx="370114" cy="369332"/>
           </a:xfrm>
           <a:prstGeom prst="rect">
             <a:avLst/>
@@ -7547,165 +8014,18 @@
           <a:lstStyle/>
           <a:p>
             <a:r>
-              <a:rPr lang="en-US" dirty="0">
-                <a:latin typeface="Times New Roman" panose="02020603050405020304" pitchFamily="18" charset="0"/>
-                <a:cs typeface="Times New Roman" panose="02020603050405020304" pitchFamily="18" charset="0"/>
-              </a:rPr>
-              <a:t>Lake Diefenbaker </a:t>
-            </a:r>
-          </a:p>
-        </p:txBody>
-      </p:sp>
-      <p:sp>
-        <p:nvSpPr>
-          <p:cNvPr id="36" name="Rectangle 35">
-            <a:extLst>
-              <a:ext uri="{FF2B5EF4-FFF2-40B4-BE49-F238E27FC236}">
-                <a16:creationId xmlns:a16="http://schemas.microsoft.com/office/drawing/2014/main" id="{7A3239F0-69FD-C744-B698-636541CC9EBC}"/>
-              </a:ext>
-            </a:extLst>
-          </p:cNvPr>
-          <p:cNvSpPr/>
-          <p:nvPr/>
-        </p:nvSpPr>
-        <p:spPr>
-          <a:xfrm>
-            <a:off x="8996857" y="2302490"/>
-            <a:ext cx="472964" cy="45719"/>
-          </a:xfrm>
-          <a:prstGeom prst="rect">
-            <a:avLst/>
-          </a:prstGeom>
-          <a:solidFill>
-            <a:schemeClr val="tx1"/>
-          </a:solidFill>
-        </p:spPr>
-        <p:style>
-          <a:lnRef idx="2">
-            <a:schemeClr val="accent1">
-              <a:shade val="50000"/>
-            </a:schemeClr>
-          </a:lnRef>
-          <a:fillRef idx="1">
-            <a:schemeClr val="accent1"/>
-          </a:fillRef>
-          <a:effectRef idx="0">
-            <a:schemeClr val="accent1"/>
-          </a:effectRef>
-          <a:fontRef idx="minor">
-            <a:schemeClr val="lt1"/>
-          </a:fontRef>
-        </p:style>
-        <p:txBody>
-          <a:bodyPr rtlCol="0" anchor="ctr"/>
-          <a:lstStyle/>
-          <a:p>
-            <a:pPr algn="ctr"/>
-            <a:endParaRPr lang="en-US"/>
-          </a:p>
-        </p:txBody>
-      </p:sp>
-      <p:cxnSp>
-        <p:nvCxnSpPr>
-          <p:cNvPr id="23" name="Straight Connector 22">
-            <a:extLst>
-              <a:ext uri="{FF2B5EF4-FFF2-40B4-BE49-F238E27FC236}">
-                <a16:creationId xmlns:a16="http://schemas.microsoft.com/office/drawing/2014/main" id="{BFBCE190-5BB2-E14E-A844-AF36A809F987}"/>
-              </a:ext>
-            </a:extLst>
-          </p:cNvPr>
-          <p:cNvCxnSpPr>
-            <a:cxnSpLocks/>
-            <a:endCxn id="7" idx="3"/>
-          </p:cNvCxnSpPr>
-          <p:nvPr/>
-        </p:nvCxnSpPr>
-        <p:spPr>
-          <a:xfrm>
-            <a:off x="9225407" y="1132490"/>
-            <a:ext cx="0" cy="1170000"/>
-          </a:xfrm>
-          <a:prstGeom prst="line">
-            <a:avLst/>
-          </a:prstGeom>
-          <a:ln w="38100">
-            <a:solidFill>
-              <a:schemeClr val="accent1"/>
-            </a:solidFill>
-            <a:headEnd type="oval" w="lg" len="lg"/>
-            <a:tailEnd type="oval" w="lg" len="lg"/>
-          </a:ln>
-        </p:spPr>
-        <p:style>
-          <a:lnRef idx="1">
-            <a:schemeClr val="accent1"/>
-          </a:lnRef>
-          <a:fillRef idx="0">
-            <a:schemeClr val="accent1"/>
-          </a:fillRef>
-          <a:effectRef idx="0">
-            <a:schemeClr val="accent1"/>
-          </a:effectRef>
-          <a:fontRef idx="minor">
-            <a:schemeClr val="tx1"/>
-          </a:fontRef>
-        </p:style>
-      </p:cxnSp>
-      <p:sp>
-        <p:nvSpPr>
-          <p:cNvPr id="37" name="Rectangle 36">
-            <a:extLst>
-              <a:ext uri="{FF2B5EF4-FFF2-40B4-BE49-F238E27FC236}">
-                <a16:creationId xmlns:a16="http://schemas.microsoft.com/office/drawing/2014/main" id="{E7C8AED5-DB78-1740-B7A8-C9A80A12D697}"/>
-              </a:ext>
-            </a:extLst>
-          </p:cNvPr>
-          <p:cNvSpPr/>
-          <p:nvPr/>
-        </p:nvSpPr>
-        <p:spPr>
-          <a:xfrm>
-            <a:off x="9192541" y="3989379"/>
-            <a:ext cx="275946" cy="45719"/>
-          </a:xfrm>
-          <a:prstGeom prst="rect">
-            <a:avLst/>
-          </a:prstGeom>
-          <a:solidFill>
-            <a:schemeClr val="tx1"/>
-          </a:solidFill>
-        </p:spPr>
-        <p:style>
-          <a:lnRef idx="2">
-            <a:schemeClr val="accent1">
-              <a:shade val="50000"/>
-            </a:schemeClr>
-          </a:lnRef>
-          <a:fillRef idx="1">
-            <a:schemeClr val="accent1"/>
-          </a:fillRef>
-          <a:effectRef idx="0">
-            <a:schemeClr val="accent1"/>
-          </a:effectRef>
-          <a:fontRef idx="minor">
-            <a:schemeClr val="lt1"/>
-          </a:fontRef>
-        </p:style>
-        <p:txBody>
-          <a:bodyPr rtlCol="0" anchor="ctr"/>
-          <a:lstStyle/>
-          <a:p>
-            <a:pPr algn="ctr"/>
-            <a:endParaRPr lang="en-US"/>
-          </a:p>
-        </p:txBody>
-      </p:sp>
-      <p:sp>
-        <p:nvSpPr>
-          <p:cNvPr id="38" name="TextBox 37">
-            <a:extLst>
-              <a:ext uri="{FF2B5EF4-FFF2-40B4-BE49-F238E27FC236}">
-                <a16:creationId xmlns:a16="http://schemas.microsoft.com/office/drawing/2014/main" id="{8537E664-8713-0843-8C6D-E569D166514B}"/>
+              <a:rPr lang="en-US" dirty="0"/>
+              <a:t>6</a:t>
+            </a:r>
+          </a:p>
+        </p:txBody>
+      </p:sp>
+      <p:sp>
+        <p:nvSpPr>
+          <p:cNvPr id="27" name="TextBox 26">
+            <a:extLst>
+              <a:ext uri="{FF2B5EF4-FFF2-40B4-BE49-F238E27FC236}">
+                <a16:creationId xmlns:a16="http://schemas.microsoft.com/office/drawing/2014/main" id="{32B05D9C-7128-7E1C-BAB5-2294E4D8CE7B}"/>
               </a:ext>
             </a:extLst>
           </p:cNvPr>
@@ -7714,8 +8034,8 @@
         </p:nvSpPr>
         <p:spPr>
           <a:xfrm>
-            <a:off x="7456997" y="2026292"/>
-            <a:ext cx="1506990" cy="369332"/>
+            <a:off x="8672247" y="3208977"/>
+            <a:ext cx="1046603" cy="369332"/>
           </a:xfrm>
           <a:prstGeom prst="rect">
             <a:avLst/>
@@ -7729,1677 +8049,8 @@
           <a:lstStyle/>
           <a:p>
             <a:r>
-              <a:rPr lang="en-US" dirty="0">
-                <a:latin typeface="Times New Roman" panose="02020603050405020304" pitchFamily="18" charset="0"/>
-                <a:cs typeface="Times New Roman" panose="02020603050405020304" pitchFamily="18" charset="0"/>
-              </a:rPr>
-              <a:t>Gardiner Dam</a:t>
-            </a:r>
-          </a:p>
-        </p:txBody>
-      </p:sp>
-      <p:sp>
-        <p:nvSpPr>
-          <p:cNvPr id="39" name="TextBox 38">
-            <a:extLst>
-              <a:ext uri="{FF2B5EF4-FFF2-40B4-BE49-F238E27FC236}">
-                <a16:creationId xmlns:a16="http://schemas.microsoft.com/office/drawing/2014/main" id="{6ED10026-A6CA-864F-BE21-F8A661001B5E}"/>
-              </a:ext>
-            </a:extLst>
-          </p:cNvPr>
-          <p:cNvSpPr txBox="1"/>
-          <p:nvPr/>
-        </p:nvSpPr>
-        <p:spPr>
-          <a:xfrm>
-            <a:off x="9468487" y="3790957"/>
-            <a:ext cx="2324120" cy="369332"/>
-          </a:xfrm>
-          <a:prstGeom prst="rect">
-            <a:avLst/>
-          </a:prstGeom>
-          <a:noFill/>
-        </p:spPr>
-        <p:txBody>
-          <a:bodyPr wrap="square" rtlCol="0">
-            <a:spAutoFit/>
-          </a:bodyPr>
-          <a:lstStyle/>
-          <a:p>
-            <a:r>
-              <a:rPr lang="en-US" dirty="0">
-                <a:latin typeface="Times New Roman" panose="02020603050405020304" pitchFamily="18" charset="0"/>
-                <a:cs typeface="Times New Roman" panose="02020603050405020304" pitchFamily="18" charset="0"/>
-              </a:rPr>
-              <a:t>Qu’Appelle Diversion</a:t>
-            </a:r>
-          </a:p>
-        </p:txBody>
-      </p:sp>
-      <p:sp>
-        <p:nvSpPr>
-          <p:cNvPr id="41" name="TextBox 40">
-            <a:extLst>
-              <a:ext uri="{FF2B5EF4-FFF2-40B4-BE49-F238E27FC236}">
-                <a16:creationId xmlns:a16="http://schemas.microsoft.com/office/drawing/2014/main" id="{D885992A-E21E-D14C-9A70-2F451EC459B8}"/>
-              </a:ext>
-            </a:extLst>
-          </p:cNvPr>
-          <p:cNvSpPr txBox="1"/>
-          <p:nvPr/>
-        </p:nvSpPr>
-        <p:spPr>
-          <a:xfrm>
-            <a:off x="8996857" y="5113401"/>
-            <a:ext cx="2758984" cy="369332"/>
-          </a:xfrm>
-          <a:prstGeom prst="rect">
-            <a:avLst/>
-          </a:prstGeom>
-          <a:noFill/>
-        </p:spPr>
-        <p:txBody>
-          <a:bodyPr wrap="square" rtlCol="0">
-            <a:spAutoFit/>
-          </a:bodyPr>
-          <a:lstStyle/>
-          <a:p>
-            <a:r>
-              <a:rPr lang="en-US" dirty="0">
-                <a:latin typeface="Times New Roman" panose="02020603050405020304" pitchFamily="18" charset="0"/>
-                <a:cs typeface="Times New Roman" panose="02020603050405020304" pitchFamily="18" charset="0"/>
-              </a:rPr>
-              <a:t>South Saskatchewan River</a:t>
-            </a:r>
-          </a:p>
-        </p:txBody>
-      </p:sp>
-      <p:sp>
-        <p:nvSpPr>
-          <p:cNvPr id="44" name="TextBox 43">
-            <a:extLst>
-              <a:ext uri="{FF2B5EF4-FFF2-40B4-BE49-F238E27FC236}">
-                <a16:creationId xmlns:a16="http://schemas.microsoft.com/office/drawing/2014/main" id="{C6D33E90-0122-AC46-A8C3-F1FCD31273D8}"/>
-              </a:ext>
-            </a:extLst>
-          </p:cNvPr>
-          <p:cNvSpPr txBox="1"/>
-          <p:nvPr/>
-        </p:nvSpPr>
-        <p:spPr>
-          <a:xfrm>
-            <a:off x="8996857" y="5486644"/>
-            <a:ext cx="2324120" cy="369332"/>
-          </a:xfrm>
-          <a:prstGeom prst="rect">
-            <a:avLst/>
-          </a:prstGeom>
-          <a:noFill/>
-        </p:spPr>
-        <p:txBody>
-          <a:bodyPr wrap="square" rtlCol="0">
-            <a:spAutoFit/>
-          </a:bodyPr>
-          <a:lstStyle/>
-          <a:p>
-            <a:r>
-              <a:rPr lang="en-US" dirty="0">
-                <a:latin typeface="Times New Roman" panose="02020603050405020304" pitchFamily="18" charset="0"/>
-                <a:cs typeface="Times New Roman" panose="02020603050405020304" pitchFamily="18" charset="0"/>
-              </a:rPr>
-              <a:t>Qu’Appelle Diversion</a:t>
-            </a:r>
-          </a:p>
-        </p:txBody>
-      </p:sp>
-      <p:sp>
-        <p:nvSpPr>
-          <p:cNvPr id="45" name="TextBox 44">
-            <a:extLst>
-              <a:ext uri="{FF2B5EF4-FFF2-40B4-BE49-F238E27FC236}">
-                <a16:creationId xmlns:a16="http://schemas.microsoft.com/office/drawing/2014/main" id="{B5D90840-37E8-3343-BD73-DD81FFECF799}"/>
-              </a:ext>
-            </a:extLst>
-          </p:cNvPr>
-          <p:cNvSpPr txBox="1"/>
-          <p:nvPr/>
-        </p:nvSpPr>
-        <p:spPr>
-          <a:xfrm>
-            <a:off x="8996857" y="5855976"/>
-            <a:ext cx="1770127" cy="369332"/>
-          </a:xfrm>
-          <a:prstGeom prst="rect">
-            <a:avLst/>
-          </a:prstGeom>
-          <a:noFill/>
-        </p:spPr>
-        <p:txBody>
-          <a:bodyPr wrap="square" rtlCol="0">
-            <a:spAutoFit/>
-          </a:bodyPr>
-          <a:lstStyle/>
-          <a:p>
-            <a:r>
-              <a:rPr lang="en-US" dirty="0">
-                <a:latin typeface="Times New Roman" panose="02020603050405020304" pitchFamily="18" charset="0"/>
-                <a:cs typeface="Times New Roman" panose="02020603050405020304" pitchFamily="18" charset="0"/>
-              </a:rPr>
-              <a:t>Red Deer River</a:t>
-            </a:r>
-          </a:p>
-        </p:txBody>
-      </p:sp>
-      <p:sp>
-        <p:nvSpPr>
-          <p:cNvPr id="46" name="TextBox 45">
-            <a:extLst>
-              <a:ext uri="{FF2B5EF4-FFF2-40B4-BE49-F238E27FC236}">
-                <a16:creationId xmlns:a16="http://schemas.microsoft.com/office/drawing/2014/main" id="{6AA46B06-29DF-E54B-8A3E-34F5D78D197A}"/>
-              </a:ext>
-            </a:extLst>
-          </p:cNvPr>
-          <p:cNvSpPr txBox="1"/>
-          <p:nvPr/>
-        </p:nvSpPr>
-        <p:spPr>
-          <a:xfrm>
-            <a:off x="9020080" y="6225308"/>
-            <a:ext cx="2300897" cy="369332"/>
-          </a:xfrm>
-          <a:prstGeom prst="rect">
-            <a:avLst/>
-          </a:prstGeom>
-          <a:noFill/>
-        </p:spPr>
-        <p:txBody>
-          <a:bodyPr wrap="square" rtlCol="0">
-            <a:spAutoFit/>
-          </a:bodyPr>
-          <a:lstStyle/>
-          <a:p>
-            <a:r>
-              <a:rPr lang="en-US" dirty="0">
-                <a:latin typeface="Times New Roman" panose="02020603050405020304" pitchFamily="18" charset="0"/>
-                <a:cs typeface="Times New Roman" panose="02020603050405020304" pitchFamily="18" charset="0"/>
-              </a:rPr>
-              <a:t>Swift Current River</a:t>
-            </a:r>
-          </a:p>
-        </p:txBody>
-      </p:sp>
-      <p:cxnSp>
-        <p:nvCxnSpPr>
-          <p:cNvPr id="47" name="Straight Connector 46">
-            <a:extLst>
-              <a:ext uri="{FF2B5EF4-FFF2-40B4-BE49-F238E27FC236}">
-                <a16:creationId xmlns:a16="http://schemas.microsoft.com/office/drawing/2014/main" id="{0B7AF11F-82EC-7C4F-AE77-D615ECF3A91B}"/>
-              </a:ext>
-            </a:extLst>
-          </p:cNvPr>
-          <p:cNvCxnSpPr>
-            <a:cxnSpLocks/>
-          </p:cNvCxnSpPr>
-          <p:nvPr/>
-        </p:nvCxnSpPr>
-        <p:spPr>
-          <a:xfrm flipH="1">
-            <a:off x="8113986" y="6064135"/>
-            <a:ext cx="850001" cy="0"/>
-          </a:xfrm>
-          <a:prstGeom prst="line">
-            <a:avLst/>
-          </a:prstGeom>
-          <a:ln w="38100">
-            <a:solidFill>
-              <a:srgbClr val="FFC000"/>
-            </a:solidFill>
-          </a:ln>
-        </p:spPr>
-        <p:style>
-          <a:lnRef idx="1">
-            <a:schemeClr val="accent1"/>
-          </a:lnRef>
-          <a:fillRef idx="0">
-            <a:schemeClr val="accent1"/>
-          </a:fillRef>
-          <a:effectRef idx="0">
-            <a:schemeClr val="accent1"/>
-          </a:effectRef>
-          <a:fontRef idx="minor">
-            <a:schemeClr val="tx1"/>
-          </a:fontRef>
-        </p:style>
-      </p:cxnSp>
-      <p:cxnSp>
-        <p:nvCxnSpPr>
-          <p:cNvPr id="49" name="Straight Connector 48">
-            <a:extLst>
-              <a:ext uri="{FF2B5EF4-FFF2-40B4-BE49-F238E27FC236}">
-                <a16:creationId xmlns:a16="http://schemas.microsoft.com/office/drawing/2014/main" id="{23650364-CA6B-D44A-B288-30197BB7FBD1}"/>
-              </a:ext>
-            </a:extLst>
-          </p:cNvPr>
-          <p:cNvCxnSpPr>
-            <a:cxnSpLocks/>
-          </p:cNvCxnSpPr>
-          <p:nvPr/>
-        </p:nvCxnSpPr>
-        <p:spPr>
-          <a:xfrm>
-            <a:off x="8113986" y="5306280"/>
-            <a:ext cx="810588" cy="0"/>
-          </a:xfrm>
-          <a:prstGeom prst="line">
-            <a:avLst/>
-          </a:prstGeom>
-          <a:ln w="38100">
-            <a:solidFill>
-              <a:schemeClr val="accent1"/>
-            </a:solidFill>
-          </a:ln>
-        </p:spPr>
-        <p:style>
-          <a:lnRef idx="1">
-            <a:schemeClr val="accent1"/>
-          </a:lnRef>
-          <a:fillRef idx="0">
-            <a:schemeClr val="accent1"/>
-          </a:fillRef>
-          <a:effectRef idx="0">
-            <a:schemeClr val="accent1"/>
-          </a:effectRef>
-          <a:fontRef idx="minor">
-            <a:schemeClr val="tx1"/>
-          </a:fontRef>
-        </p:style>
-      </p:cxnSp>
-      <p:cxnSp>
-        <p:nvCxnSpPr>
-          <p:cNvPr id="51" name="Straight Connector 50">
-            <a:extLst>
-              <a:ext uri="{FF2B5EF4-FFF2-40B4-BE49-F238E27FC236}">
-                <a16:creationId xmlns:a16="http://schemas.microsoft.com/office/drawing/2014/main" id="{1F4DDA91-1476-7843-B3A2-A3E324DD02A4}"/>
-              </a:ext>
-            </a:extLst>
-          </p:cNvPr>
-          <p:cNvCxnSpPr>
-            <a:cxnSpLocks/>
-          </p:cNvCxnSpPr>
-          <p:nvPr/>
-        </p:nvCxnSpPr>
-        <p:spPr>
-          <a:xfrm>
-            <a:off x="8113986" y="6409974"/>
-            <a:ext cx="810588" cy="0"/>
-          </a:xfrm>
-          <a:prstGeom prst="line">
-            <a:avLst/>
-          </a:prstGeom>
-          <a:ln w="38100">
-            <a:solidFill>
-              <a:srgbClr val="00B050"/>
-            </a:solidFill>
-            <a:headEnd type="none" w="lg" len="lg"/>
-          </a:ln>
-        </p:spPr>
-        <p:style>
-          <a:lnRef idx="1">
-            <a:schemeClr val="accent1"/>
-          </a:lnRef>
-          <a:fillRef idx="0">
-            <a:schemeClr val="accent1"/>
-          </a:fillRef>
-          <a:effectRef idx="0">
-            <a:schemeClr val="accent1"/>
-          </a:effectRef>
-          <a:fontRef idx="minor">
-            <a:schemeClr val="tx1"/>
-          </a:fontRef>
-        </p:style>
-      </p:cxnSp>
-      <p:cxnSp>
-        <p:nvCxnSpPr>
-          <p:cNvPr id="55" name="Straight Connector 54">
-            <a:extLst>
-              <a:ext uri="{FF2B5EF4-FFF2-40B4-BE49-F238E27FC236}">
-                <a16:creationId xmlns:a16="http://schemas.microsoft.com/office/drawing/2014/main" id="{2C31F456-244A-7341-A317-92B27D8F0DA3}"/>
-              </a:ext>
-            </a:extLst>
-          </p:cNvPr>
-          <p:cNvCxnSpPr>
-            <a:cxnSpLocks/>
-          </p:cNvCxnSpPr>
-          <p:nvPr/>
-        </p:nvCxnSpPr>
-        <p:spPr>
-          <a:xfrm>
-            <a:off x="8113986" y="5692330"/>
-            <a:ext cx="815843" cy="1"/>
-          </a:xfrm>
-          <a:prstGeom prst="line">
-            <a:avLst/>
-          </a:prstGeom>
-          <a:ln w="38100">
-            <a:solidFill>
-              <a:srgbClr val="FF0000"/>
-            </a:solidFill>
-            <a:headEnd type="none" w="lg" len="lg"/>
-          </a:ln>
-        </p:spPr>
-        <p:style>
-          <a:lnRef idx="1">
-            <a:schemeClr val="accent1"/>
-          </a:lnRef>
-          <a:fillRef idx="0">
-            <a:schemeClr val="accent1"/>
-          </a:fillRef>
-          <a:effectRef idx="0">
-            <a:schemeClr val="accent1"/>
-          </a:effectRef>
-          <a:fontRef idx="minor">
-            <a:schemeClr val="tx1"/>
-          </a:fontRef>
-        </p:style>
-      </p:cxnSp>
-      <p:sp>
-        <p:nvSpPr>
-          <p:cNvPr id="2" name="5-Point Star 1">
-            <a:extLst>
-              <a:ext uri="{FF2B5EF4-FFF2-40B4-BE49-F238E27FC236}">
-                <a16:creationId xmlns:a16="http://schemas.microsoft.com/office/drawing/2014/main" id="{153B4E3E-A394-1B4C-B8E8-A55BB34BACCE}"/>
-              </a:ext>
-            </a:extLst>
-          </p:cNvPr>
-          <p:cNvSpPr/>
-          <p:nvPr/>
-        </p:nvSpPr>
-        <p:spPr>
-          <a:xfrm>
-            <a:off x="4025450" y="2503327"/>
-            <a:ext cx="144000" cy="144000"/>
-          </a:xfrm>
-          <a:prstGeom prst="star5">
-            <a:avLst/>
-          </a:prstGeom>
-        </p:spPr>
-        <p:style>
-          <a:lnRef idx="2">
-            <a:schemeClr val="accent1">
-              <a:shade val="50000"/>
-            </a:schemeClr>
-          </a:lnRef>
-          <a:fillRef idx="1">
-            <a:schemeClr val="accent1"/>
-          </a:fillRef>
-          <a:effectRef idx="0">
-            <a:schemeClr val="accent1"/>
-          </a:effectRef>
-          <a:fontRef idx="minor">
-            <a:schemeClr val="lt1"/>
-          </a:fontRef>
-        </p:style>
-        <p:txBody>
-          <a:bodyPr rtlCol="0" anchor="ctr"/>
-          <a:lstStyle/>
-          <a:p>
-            <a:pPr algn="ctr"/>
-            <a:endParaRPr lang="en-US"/>
-          </a:p>
-        </p:txBody>
-      </p:sp>
-      <p:sp>
-        <p:nvSpPr>
-          <p:cNvPr id="40" name="5-Point Star 39">
-            <a:extLst>
-              <a:ext uri="{FF2B5EF4-FFF2-40B4-BE49-F238E27FC236}">
-                <a16:creationId xmlns:a16="http://schemas.microsoft.com/office/drawing/2014/main" id="{F8D7EF91-BE9C-1044-9690-E7488AB6A139}"/>
-              </a:ext>
-            </a:extLst>
-          </p:cNvPr>
-          <p:cNvSpPr/>
-          <p:nvPr/>
-        </p:nvSpPr>
-        <p:spPr>
-          <a:xfrm>
-            <a:off x="3390103" y="4731228"/>
-            <a:ext cx="144000" cy="144000"/>
-          </a:xfrm>
-          <a:prstGeom prst="star5">
-            <a:avLst/>
-          </a:prstGeom>
-        </p:spPr>
-        <p:style>
-          <a:lnRef idx="2">
-            <a:schemeClr val="accent1">
-              <a:shade val="50000"/>
-            </a:schemeClr>
-          </a:lnRef>
-          <a:fillRef idx="1">
-            <a:schemeClr val="accent1"/>
-          </a:fillRef>
-          <a:effectRef idx="0">
-            <a:schemeClr val="accent1"/>
-          </a:effectRef>
-          <a:fontRef idx="minor">
-            <a:schemeClr val="lt1"/>
-          </a:fontRef>
-        </p:style>
-        <p:txBody>
-          <a:bodyPr rtlCol="0" anchor="ctr"/>
-          <a:lstStyle/>
-          <a:p>
-            <a:pPr algn="ctr"/>
-            <a:endParaRPr lang="en-US"/>
-          </a:p>
-        </p:txBody>
-      </p:sp>
-      <p:sp>
-        <p:nvSpPr>
-          <p:cNvPr id="42" name="5-Point Star 41">
-            <a:extLst>
-              <a:ext uri="{FF2B5EF4-FFF2-40B4-BE49-F238E27FC236}">
-                <a16:creationId xmlns:a16="http://schemas.microsoft.com/office/drawing/2014/main" id="{90A8C741-08C6-7C41-8A6E-5D0C65721043}"/>
-              </a:ext>
-            </a:extLst>
-          </p:cNvPr>
-          <p:cNvSpPr/>
-          <p:nvPr/>
-        </p:nvSpPr>
-        <p:spPr>
-          <a:xfrm>
-            <a:off x="4098496" y="4716830"/>
-            <a:ext cx="144000" cy="144000"/>
-          </a:xfrm>
-          <a:prstGeom prst="star5">
-            <a:avLst/>
-          </a:prstGeom>
-        </p:spPr>
-        <p:style>
-          <a:lnRef idx="2">
-            <a:schemeClr val="accent1">
-              <a:shade val="50000"/>
-            </a:schemeClr>
-          </a:lnRef>
-          <a:fillRef idx="1">
-            <a:schemeClr val="accent1"/>
-          </a:fillRef>
-          <a:effectRef idx="0">
-            <a:schemeClr val="accent1"/>
-          </a:effectRef>
-          <a:fontRef idx="minor">
-            <a:schemeClr val="lt1"/>
-          </a:fontRef>
-        </p:style>
-        <p:txBody>
-          <a:bodyPr rtlCol="0" anchor="ctr"/>
-          <a:lstStyle/>
-          <a:p>
-            <a:pPr algn="ctr"/>
-            <a:endParaRPr lang="en-US"/>
-          </a:p>
-        </p:txBody>
-      </p:sp>
-      <p:sp>
-        <p:nvSpPr>
-          <p:cNvPr id="43" name="5-Point Star 42">
-            <a:extLst>
-              <a:ext uri="{FF2B5EF4-FFF2-40B4-BE49-F238E27FC236}">
-                <a16:creationId xmlns:a16="http://schemas.microsoft.com/office/drawing/2014/main" id="{03D37EBE-A5F9-3642-8556-8195DD026317}"/>
-              </a:ext>
-            </a:extLst>
-          </p:cNvPr>
-          <p:cNvSpPr/>
-          <p:nvPr/>
-        </p:nvSpPr>
-        <p:spPr>
-          <a:xfrm>
-            <a:off x="4316069" y="4366976"/>
-            <a:ext cx="144000" cy="144000"/>
-          </a:xfrm>
-          <a:prstGeom prst="star5">
-            <a:avLst/>
-          </a:prstGeom>
-        </p:spPr>
-        <p:style>
-          <a:lnRef idx="2">
-            <a:schemeClr val="accent1">
-              <a:shade val="50000"/>
-            </a:schemeClr>
-          </a:lnRef>
-          <a:fillRef idx="1">
-            <a:schemeClr val="accent1"/>
-          </a:fillRef>
-          <a:effectRef idx="0">
-            <a:schemeClr val="accent1"/>
-          </a:effectRef>
-          <a:fontRef idx="minor">
-            <a:schemeClr val="lt1"/>
-          </a:fontRef>
-        </p:style>
-        <p:txBody>
-          <a:bodyPr rtlCol="0" anchor="ctr"/>
-          <a:lstStyle/>
-          <a:p>
-            <a:pPr algn="ctr"/>
-            <a:endParaRPr lang="en-US"/>
-          </a:p>
-        </p:txBody>
-      </p:sp>
-      <p:sp>
-        <p:nvSpPr>
-          <p:cNvPr id="48" name="5-Point Star 47">
-            <a:extLst>
-              <a:ext uri="{FF2B5EF4-FFF2-40B4-BE49-F238E27FC236}">
-                <a16:creationId xmlns:a16="http://schemas.microsoft.com/office/drawing/2014/main" id="{34966359-B5DA-F640-A128-2FA5EBD22FE9}"/>
-              </a:ext>
-            </a:extLst>
-          </p:cNvPr>
-          <p:cNvSpPr/>
-          <p:nvPr/>
-        </p:nvSpPr>
-        <p:spPr>
-          <a:xfrm>
-            <a:off x="4316069" y="3640092"/>
-            <a:ext cx="144000" cy="144000"/>
-          </a:xfrm>
-          <a:prstGeom prst="star5">
-            <a:avLst/>
-          </a:prstGeom>
-        </p:spPr>
-        <p:style>
-          <a:lnRef idx="2">
-            <a:schemeClr val="accent1">
-              <a:shade val="50000"/>
-            </a:schemeClr>
-          </a:lnRef>
-          <a:fillRef idx="1">
-            <a:schemeClr val="accent1"/>
-          </a:fillRef>
-          <a:effectRef idx="0">
-            <a:schemeClr val="accent1"/>
-          </a:effectRef>
-          <a:fontRef idx="minor">
-            <a:schemeClr val="lt1"/>
-          </a:fontRef>
-        </p:style>
-        <p:txBody>
-          <a:bodyPr rtlCol="0" anchor="ctr"/>
-          <a:lstStyle/>
-          <a:p>
-            <a:pPr algn="ctr"/>
-            <a:endParaRPr lang="en-US"/>
-          </a:p>
-        </p:txBody>
-      </p:sp>
-      <p:sp>
-        <p:nvSpPr>
-          <p:cNvPr id="50" name="5-Point Star 49">
-            <a:extLst>
-              <a:ext uri="{FF2B5EF4-FFF2-40B4-BE49-F238E27FC236}">
-                <a16:creationId xmlns:a16="http://schemas.microsoft.com/office/drawing/2014/main" id="{849C8924-E92C-A748-973F-D909DC0FA9BA}"/>
-              </a:ext>
-            </a:extLst>
-          </p:cNvPr>
-          <p:cNvSpPr/>
-          <p:nvPr/>
-        </p:nvSpPr>
-        <p:spPr>
-          <a:xfrm>
-            <a:off x="9153407" y="1414863"/>
-            <a:ext cx="144000" cy="144000"/>
-          </a:xfrm>
-          <a:prstGeom prst="star5">
-            <a:avLst/>
-          </a:prstGeom>
-        </p:spPr>
-        <p:style>
-          <a:lnRef idx="2">
-            <a:schemeClr val="accent1">
-              <a:shade val="50000"/>
-            </a:schemeClr>
-          </a:lnRef>
-          <a:fillRef idx="1">
-            <a:schemeClr val="accent1"/>
-          </a:fillRef>
-          <a:effectRef idx="0">
-            <a:schemeClr val="accent1"/>
-          </a:effectRef>
-          <a:fontRef idx="minor">
-            <a:schemeClr val="lt1"/>
-          </a:fontRef>
-        </p:style>
-        <p:txBody>
-          <a:bodyPr rtlCol="0" anchor="ctr"/>
-          <a:lstStyle/>
-          <a:p>
-            <a:pPr algn="ctr"/>
-            <a:endParaRPr lang="en-US"/>
-          </a:p>
-        </p:txBody>
-      </p:sp>
-      <p:sp>
-        <p:nvSpPr>
-          <p:cNvPr id="52" name="5-Point Star 51">
-            <a:extLst>
-              <a:ext uri="{FF2B5EF4-FFF2-40B4-BE49-F238E27FC236}">
-                <a16:creationId xmlns:a16="http://schemas.microsoft.com/office/drawing/2014/main" id="{4BFC8345-E90D-DF4C-8A59-DDF399B4E510}"/>
-              </a:ext>
-            </a:extLst>
-          </p:cNvPr>
-          <p:cNvSpPr/>
-          <p:nvPr/>
-        </p:nvSpPr>
-        <p:spPr>
-          <a:xfrm>
-            <a:off x="9153407" y="1769236"/>
-            <a:ext cx="144000" cy="144000"/>
-          </a:xfrm>
-          <a:prstGeom prst="star5">
-            <a:avLst/>
-          </a:prstGeom>
-        </p:spPr>
-        <p:style>
-          <a:lnRef idx="2">
-            <a:schemeClr val="accent1">
-              <a:shade val="50000"/>
-            </a:schemeClr>
-          </a:lnRef>
-          <a:fillRef idx="1">
-            <a:schemeClr val="accent1"/>
-          </a:fillRef>
-          <a:effectRef idx="0">
-            <a:schemeClr val="accent1"/>
-          </a:effectRef>
-          <a:fontRef idx="minor">
-            <a:schemeClr val="lt1"/>
-          </a:fontRef>
-        </p:style>
-        <p:txBody>
-          <a:bodyPr rtlCol="0" anchor="ctr"/>
-          <a:lstStyle/>
-          <a:p>
-            <a:pPr algn="ctr"/>
-            <a:endParaRPr lang="en-US"/>
-          </a:p>
-        </p:txBody>
-      </p:sp>
-      <p:sp>
-        <p:nvSpPr>
-          <p:cNvPr id="4" name="TextBox 3">
-            <a:extLst>
-              <a:ext uri="{FF2B5EF4-FFF2-40B4-BE49-F238E27FC236}">
-                <a16:creationId xmlns:a16="http://schemas.microsoft.com/office/drawing/2014/main" id="{F738FAF3-2659-7E4A-83E1-6AD222A3DEC4}"/>
-              </a:ext>
-            </a:extLst>
-          </p:cNvPr>
-          <p:cNvSpPr txBox="1"/>
-          <p:nvPr/>
-        </p:nvSpPr>
-        <p:spPr>
-          <a:xfrm>
-            <a:off x="3154165" y="2210958"/>
-            <a:ext cx="799279" cy="369332"/>
-          </a:xfrm>
-          <a:prstGeom prst="rect">
-            <a:avLst/>
-          </a:prstGeom>
-          <a:noFill/>
-        </p:spPr>
-        <p:txBody>
-          <a:bodyPr wrap="square" rtlCol="0">
-            <a:spAutoFit/>
-          </a:bodyPr>
-          <a:lstStyle/>
-          <a:p>
-            <a:r>
-              <a:rPr lang="en-US" dirty="0"/>
-              <a:t>35km</a:t>
-            </a:r>
-          </a:p>
-        </p:txBody>
-      </p:sp>
-      <p:sp>
-        <p:nvSpPr>
-          <p:cNvPr id="53" name="TextBox 52">
-            <a:extLst>
-              <a:ext uri="{FF2B5EF4-FFF2-40B4-BE49-F238E27FC236}">
-                <a16:creationId xmlns:a16="http://schemas.microsoft.com/office/drawing/2014/main" id="{70732A90-712F-D64F-8CE9-4E336F39436B}"/>
-              </a:ext>
-            </a:extLst>
-          </p:cNvPr>
-          <p:cNvSpPr txBox="1"/>
-          <p:nvPr/>
-        </p:nvSpPr>
-        <p:spPr>
-          <a:xfrm>
-            <a:off x="4409513" y="2210958"/>
-            <a:ext cx="799279" cy="369332"/>
-          </a:xfrm>
-          <a:prstGeom prst="rect">
-            <a:avLst/>
-          </a:prstGeom>
-          <a:noFill/>
-        </p:spPr>
-        <p:txBody>
-          <a:bodyPr wrap="square" rtlCol="0">
-            <a:spAutoFit/>
-          </a:bodyPr>
-          <a:lstStyle/>
-          <a:p>
-            <a:r>
-              <a:rPr lang="en-US" dirty="0"/>
-              <a:t>35km</a:t>
-            </a:r>
-          </a:p>
-        </p:txBody>
-      </p:sp>
-      <p:sp>
-        <p:nvSpPr>
-          <p:cNvPr id="54" name="TextBox 53">
-            <a:extLst>
-              <a:ext uri="{FF2B5EF4-FFF2-40B4-BE49-F238E27FC236}">
-                <a16:creationId xmlns:a16="http://schemas.microsoft.com/office/drawing/2014/main" id="{C5FA9C24-F256-A94F-A182-36F6D06AC312}"/>
-              </a:ext>
-            </a:extLst>
-          </p:cNvPr>
-          <p:cNvSpPr txBox="1"/>
-          <p:nvPr/>
-        </p:nvSpPr>
-        <p:spPr>
-          <a:xfrm>
-            <a:off x="2739931" y="4376295"/>
-            <a:ext cx="799279" cy="369332"/>
-          </a:xfrm>
-          <a:prstGeom prst="rect">
-            <a:avLst/>
-          </a:prstGeom>
-          <a:noFill/>
-        </p:spPr>
-        <p:txBody>
-          <a:bodyPr wrap="square" rtlCol="0">
-            <a:spAutoFit/>
-          </a:bodyPr>
-          <a:lstStyle/>
-          <a:p>
-            <a:r>
-              <a:rPr lang="en-US" dirty="0"/>
-              <a:t>50km</a:t>
-            </a:r>
-          </a:p>
-        </p:txBody>
-      </p:sp>
-      <p:sp>
-        <p:nvSpPr>
-          <p:cNvPr id="56" name="TextBox 55">
-            <a:extLst>
-              <a:ext uri="{FF2B5EF4-FFF2-40B4-BE49-F238E27FC236}">
-                <a16:creationId xmlns:a16="http://schemas.microsoft.com/office/drawing/2014/main" id="{F0D65D7E-2739-5940-A185-DB246D53C47D}"/>
-              </a:ext>
-            </a:extLst>
-          </p:cNvPr>
-          <p:cNvSpPr txBox="1"/>
-          <p:nvPr/>
-        </p:nvSpPr>
-        <p:spPr>
-          <a:xfrm>
-            <a:off x="3486322" y="4789551"/>
-            <a:ext cx="799279" cy="369332"/>
-          </a:xfrm>
-          <a:prstGeom prst="rect">
-            <a:avLst/>
-          </a:prstGeom>
-          <a:noFill/>
-        </p:spPr>
-        <p:txBody>
-          <a:bodyPr wrap="square" rtlCol="0">
-            <a:spAutoFit/>
-          </a:bodyPr>
-          <a:lstStyle/>
-          <a:p>
-            <a:r>
-              <a:rPr lang="en-US" dirty="0"/>
-              <a:t>50km</a:t>
-            </a:r>
-          </a:p>
-        </p:txBody>
-      </p:sp>
-      <p:sp>
-        <p:nvSpPr>
-          <p:cNvPr id="57" name="TextBox 56">
-            <a:extLst>
-              <a:ext uri="{FF2B5EF4-FFF2-40B4-BE49-F238E27FC236}">
-                <a16:creationId xmlns:a16="http://schemas.microsoft.com/office/drawing/2014/main" id="{C83E22CD-F3EB-E343-8B27-8C9302626EBA}"/>
-              </a:ext>
-            </a:extLst>
-          </p:cNvPr>
-          <p:cNvSpPr txBox="1"/>
-          <p:nvPr/>
-        </p:nvSpPr>
-        <p:spPr>
-          <a:xfrm>
-            <a:off x="4376289" y="4532164"/>
-            <a:ext cx="799279" cy="369332"/>
-          </a:xfrm>
-          <a:prstGeom prst="rect">
-            <a:avLst/>
-          </a:prstGeom>
-          <a:noFill/>
-        </p:spPr>
-        <p:txBody>
-          <a:bodyPr wrap="square" rtlCol="0">
-            <a:spAutoFit/>
-          </a:bodyPr>
-          <a:lstStyle/>
-          <a:p>
-            <a:r>
-              <a:rPr lang="en-US" dirty="0"/>
-              <a:t>50km</a:t>
-            </a:r>
-          </a:p>
-        </p:txBody>
-      </p:sp>
-      <p:sp>
-        <p:nvSpPr>
-          <p:cNvPr id="58" name="TextBox 57">
-            <a:extLst>
-              <a:ext uri="{FF2B5EF4-FFF2-40B4-BE49-F238E27FC236}">
-                <a16:creationId xmlns:a16="http://schemas.microsoft.com/office/drawing/2014/main" id="{A0238F60-F1F0-2744-95CA-4F78665C5838}"/>
-              </a:ext>
-            </a:extLst>
-          </p:cNvPr>
-          <p:cNvSpPr txBox="1"/>
-          <p:nvPr/>
-        </p:nvSpPr>
-        <p:spPr>
-          <a:xfrm>
-            <a:off x="4388069" y="3862112"/>
-            <a:ext cx="799279" cy="369332"/>
-          </a:xfrm>
-          <a:prstGeom prst="rect">
-            <a:avLst/>
-          </a:prstGeom>
-          <a:noFill/>
-        </p:spPr>
-        <p:txBody>
-          <a:bodyPr wrap="square" rtlCol="0">
-            <a:spAutoFit/>
-          </a:bodyPr>
-          <a:lstStyle/>
-          <a:p>
-            <a:r>
-              <a:rPr lang="en-US" dirty="0"/>
-              <a:t>50km</a:t>
-            </a:r>
-          </a:p>
-        </p:txBody>
-      </p:sp>
-      <p:sp>
-        <p:nvSpPr>
-          <p:cNvPr id="59" name="TextBox 58">
-            <a:extLst>
-              <a:ext uri="{FF2B5EF4-FFF2-40B4-BE49-F238E27FC236}">
-                <a16:creationId xmlns:a16="http://schemas.microsoft.com/office/drawing/2014/main" id="{7547D860-32CD-C34D-90F7-74EDFA5315BC}"/>
-              </a:ext>
-            </a:extLst>
-          </p:cNvPr>
-          <p:cNvSpPr txBox="1"/>
-          <p:nvPr/>
-        </p:nvSpPr>
-        <p:spPr>
-          <a:xfrm>
-            <a:off x="4064383" y="3091720"/>
-            <a:ext cx="799279" cy="369332"/>
-          </a:xfrm>
-          <a:prstGeom prst="rect">
-            <a:avLst/>
-          </a:prstGeom>
-          <a:noFill/>
-        </p:spPr>
-        <p:txBody>
-          <a:bodyPr wrap="square" rtlCol="0">
-            <a:spAutoFit/>
-          </a:bodyPr>
-          <a:lstStyle/>
-          <a:p>
-            <a:r>
-              <a:rPr lang="en-US" dirty="0"/>
-              <a:t>30km</a:t>
-            </a:r>
-          </a:p>
-        </p:txBody>
-      </p:sp>
-      <p:sp>
-        <p:nvSpPr>
-          <p:cNvPr id="60" name="TextBox 59">
-            <a:extLst>
-              <a:ext uri="{FF2B5EF4-FFF2-40B4-BE49-F238E27FC236}">
-                <a16:creationId xmlns:a16="http://schemas.microsoft.com/office/drawing/2014/main" id="{ABEBF77C-A975-3444-A2E5-05410D2BBD26}"/>
-              </a:ext>
-            </a:extLst>
-          </p:cNvPr>
-          <p:cNvSpPr txBox="1"/>
-          <p:nvPr/>
-        </p:nvSpPr>
-        <p:spPr>
-          <a:xfrm>
-            <a:off x="4721823" y="3073648"/>
-            <a:ext cx="799279" cy="369332"/>
-          </a:xfrm>
-          <a:prstGeom prst="rect">
-            <a:avLst/>
-          </a:prstGeom>
-          <a:noFill/>
-        </p:spPr>
-        <p:txBody>
-          <a:bodyPr wrap="square" rtlCol="0">
-            <a:spAutoFit/>
-          </a:bodyPr>
-          <a:lstStyle/>
-          <a:p>
-            <a:r>
-              <a:rPr lang="en-US" dirty="0"/>
-              <a:t>50km</a:t>
-            </a:r>
-          </a:p>
-        </p:txBody>
-      </p:sp>
-      <p:sp>
-        <p:nvSpPr>
-          <p:cNvPr id="61" name="TextBox 60">
-            <a:extLst>
-              <a:ext uri="{FF2B5EF4-FFF2-40B4-BE49-F238E27FC236}">
-                <a16:creationId xmlns:a16="http://schemas.microsoft.com/office/drawing/2014/main" id="{2B9C8D11-855C-964F-A1A2-4A3AEC303205}"/>
-              </a:ext>
-            </a:extLst>
-          </p:cNvPr>
-          <p:cNvSpPr txBox="1"/>
-          <p:nvPr/>
-        </p:nvSpPr>
-        <p:spPr>
-          <a:xfrm>
-            <a:off x="6437100" y="3804713"/>
-            <a:ext cx="799279" cy="369332"/>
-          </a:xfrm>
-          <a:prstGeom prst="rect">
-            <a:avLst/>
-          </a:prstGeom>
-          <a:noFill/>
-        </p:spPr>
-        <p:txBody>
-          <a:bodyPr wrap="square" rtlCol="0">
-            <a:spAutoFit/>
-          </a:bodyPr>
-          <a:lstStyle/>
-          <a:p>
-            <a:r>
-              <a:rPr lang="en-US" dirty="0"/>
-              <a:t>60km</a:t>
-            </a:r>
-          </a:p>
-        </p:txBody>
-      </p:sp>
-      <p:sp>
-        <p:nvSpPr>
-          <p:cNvPr id="62" name="TextBox 61">
-            <a:extLst>
-              <a:ext uri="{FF2B5EF4-FFF2-40B4-BE49-F238E27FC236}">
-                <a16:creationId xmlns:a16="http://schemas.microsoft.com/office/drawing/2014/main" id="{C4F7A92A-A62B-7E47-ACA2-F90D6CCA3A4A}"/>
-              </a:ext>
-            </a:extLst>
-          </p:cNvPr>
-          <p:cNvSpPr txBox="1"/>
-          <p:nvPr/>
-        </p:nvSpPr>
-        <p:spPr>
-          <a:xfrm>
-            <a:off x="8564347" y="1819452"/>
-            <a:ext cx="799279" cy="369332"/>
-          </a:xfrm>
-          <a:prstGeom prst="rect">
-            <a:avLst/>
-          </a:prstGeom>
-          <a:noFill/>
-        </p:spPr>
-        <p:txBody>
-          <a:bodyPr wrap="square" rtlCol="0">
-            <a:spAutoFit/>
-          </a:bodyPr>
-          <a:lstStyle/>
-          <a:p>
-            <a:r>
-              <a:rPr lang="en-US" dirty="0"/>
-              <a:t>50km</a:t>
-            </a:r>
-          </a:p>
-        </p:txBody>
-      </p:sp>
-      <p:sp>
-        <p:nvSpPr>
-          <p:cNvPr id="63" name="TextBox 62">
-            <a:extLst>
-              <a:ext uri="{FF2B5EF4-FFF2-40B4-BE49-F238E27FC236}">
-                <a16:creationId xmlns:a16="http://schemas.microsoft.com/office/drawing/2014/main" id="{FFE1C328-E43D-AC4E-ADB6-7A21C8DEE40F}"/>
-              </a:ext>
-            </a:extLst>
-          </p:cNvPr>
-          <p:cNvSpPr txBox="1"/>
-          <p:nvPr/>
-        </p:nvSpPr>
-        <p:spPr>
-          <a:xfrm>
-            <a:off x="9229965" y="1488926"/>
-            <a:ext cx="799279" cy="369332"/>
-          </a:xfrm>
-          <a:prstGeom prst="rect">
-            <a:avLst/>
-          </a:prstGeom>
-          <a:noFill/>
-        </p:spPr>
-        <p:txBody>
-          <a:bodyPr wrap="square" rtlCol="0">
-            <a:spAutoFit/>
-          </a:bodyPr>
-          <a:lstStyle/>
-          <a:p>
-            <a:r>
-              <a:rPr lang="en-US" dirty="0"/>
-              <a:t>50km</a:t>
-            </a:r>
-          </a:p>
-        </p:txBody>
-      </p:sp>
-      <p:sp>
-        <p:nvSpPr>
-          <p:cNvPr id="64" name="TextBox 63">
-            <a:extLst>
-              <a:ext uri="{FF2B5EF4-FFF2-40B4-BE49-F238E27FC236}">
-                <a16:creationId xmlns:a16="http://schemas.microsoft.com/office/drawing/2014/main" id="{B56A02B5-2093-324D-9D1A-31FBDE9821A9}"/>
-              </a:ext>
-            </a:extLst>
-          </p:cNvPr>
-          <p:cNvSpPr txBox="1"/>
-          <p:nvPr/>
-        </p:nvSpPr>
-        <p:spPr>
-          <a:xfrm>
-            <a:off x="9229965" y="1119459"/>
-            <a:ext cx="799279" cy="369332"/>
-          </a:xfrm>
-          <a:prstGeom prst="rect">
-            <a:avLst/>
-          </a:prstGeom>
-          <a:noFill/>
-        </p:spPr>
-        <p:txBody>
-          <a:bodyPr wrap="square" rtlCol="0">
-            <a:spAutoFit/>
-          </a:bodyPr>
-          <a:lstStyle/>
-          <a:p>
-            <a:r>
-              <a:rPr lang="en-US" dirty="0"/>
-              <a:t>50km</a:t>
-            </a:r>
-          </a:p>
-        </p:txBody>
-      </p:sp>
-      <p:sp>
-        <p:nvSpPr>
-          <p:cNvPr id="65" name="TextBox 64">
-            <a:extLst>
-              <a:ext uri="{FF2B5EF4-FFF2-40B4-BE49-F238E27FC236}">
-                <a16:creationId xmlns:a16="http://schemas.microsoft.com/office/drawing/2014/main" id="{1514CCA4-66AF-924C-A678-6EFC490D627F}"/>
-              </a:ext>
-            </a:extLst>
-          </p:cNvPr>
-          <p:cNvSpPr txBox="1"/>
-          <p:nvPr/>
-        </p:nvSpPr>
-        <p:spPr>
-          <a:xfrm>
-            <a:off x="8737309" y="1107564"/>
-            <a:ext cx="452098" cy="369332"/>
-          </a:xfrm>
-          <a:prstGeom prst="rect">
-            <a:avLst/>
-          </a:prstGeom>
-          <a:noFill/>
-        </p:spPr>
-        <p:txBody>
-          <a:bodyPr wrap="square" rtlCol="0">
-            <a:spAutoFit/>
-          </a:bodyPr>
-          <a:lstStyle/>
-          <a:p>
-            <a:r>
-              <a:rPr lang="en-US" dirty="0"/>
-              <a:t>16</a:t>
-            </a:r>
-          </a:p>
-        </p:txBody>
-      </p:sp>
-      <p:sp>
-        <p:nvSpPr>
-          <p:cNvPr id="66" name="TextBox 65">
-            <a:extLst>
-              <a:ext uri="{FF2B5EF4-FFF2-40B4-BE49-F238E27FC236}">
-                <a16:creationId xmlns:a16="http://schemas.microsoft.com/office/drawing/2014/main" id="{620F091D-0A69-344B-9E09-A0C0214B73C0}"/>
-              </a:ext>
-            </a:extLst>
-          </p:cNvPr>
-          <p:cNvSpPr txBox="1"/>
-          <p:nvPr/>
-        </p:nvSpPr>
-        <p:spPr>
-          <a:xfrm>
-            <a:off x="8735599" y="1455170"/>
-            <a:ext cx="452098" cy="369332"/>
-          </a:xfrm>
-          <a:prstGeom prst="rect">
-            <a:avLst/>
-          </a:prstGeom>
-          <a:noFill/>
-        </p:spPr>
-        <p:txBody>
-          <a:bodyPr wrap="square" rtlCol="0">
-            <a:spAutoFit/>
-          </a:bodyPr>
-          <a:lstStyle/>
-          <a:p>
-            <a:r>
-              <a:rPr lang="en-US" dirty="0"/>
-              <a:t>15</a:t>
-            </a:r>
-          </a:p>
-        </p:txBody>
-      </p:sp>
-      <p:sp>
-        <p:nvSpPr>
-          <p:cNvPr id="67" name="TextBox 66">
-            <a:extLst>
-              <a:ext uri="{FF2B5EF4-FFF2-40B4-BE49-F238E27FC236}">
-                <a16:creationId xmlns:a16="http://schemas.microsoft.com/office/drawing/2014/main" id="{656B641C-1E20-284B-AA29-A3A9732A0762}"/>
-              </a:ext>
-            </a:extLst>
-          </p:cNvPr>
-          <p:cNvSpPr txBox="1"/>
-          <p:nvPr/>
-        </p:nvSpPr>
-        <p:spPr>
-          <a:xfrm>
-            <a:off x="9217262" y="1783651"/>
-            <a:ext cx="452098" cy="369332"/>
-          </a:xfrm>
-          <a:prstGeom prst="rect">
-            <a:avLst/>
-          </a:prstGeom>
-          <a:noFill/>
-        </p:spPr>
-        <p:txBody>
-          <a:bodyPr wrap="square" rtlCol="0">
-            <a:spAutoFit/>
-          </a:bodyPr>
-          <a:lstStyle/>
-          <a:p>
-            <a:r>
-              <a:rPr lang="en-US" dirty="0"/>
-              <a:t>14</a:t>
-            </a:r>
-          </a:p>
-        </p:txBody>
-      </p:sp>
-      <p:sp>
-        <p:nvSpPr>
-          <p:cNvPr id="68" name="TextBox 67">
-            <a:extLst>
-              <a:ext uri="{FF2B5EF4-FFF2-40B4-BE49-F238E27FC236}">
-                <a16:creationId xmlns:a16="http://schemas.microsoft.com/office/drawing/2014/main" id="{6B20FD1F-4113-034B-982B-A3ED48489605}"/>
-              </a:ext>
-            </a:extLst>
-          </p:cNvPr>
-          <p:cNvSpPr txBox="1"/>
-          <p:nvPr/>
-        </p:nvSpPr>
-        <p:spPr>
-          <a:xfrm>
-            <a:off x="9032229" y="2646197"/>
-            <a:ext cx="452098" cy="369332"/>
-          </a:xfrm>
-          <a:prstGeom prst="rect">
-            <a:avLst/>
-          </a:prstGeom>
-          <a:noFill/>
-        </p:spPr>
-        <p:txBody>
-          <a:bodyPr wrap="square" rtlCol="0">
-            <a:spAutoFit/>
-          </a:bodyPr>
-          <a:lstStyle/>
-          <a:p>
-            <a:r>
-              <a:rPr lang="en-US" dirty="0"/>
-              <a:t>13</a:t>
-            </a:r>
-          </a:p>
-        </p:txBody>
-      </p:sp>
-      <p:sp>
-        <p:nvSpPr>
-          <p:cNvPr id="69" name="TextBox 68">
-            <a:extLst>
-              <a:ext uri="{FF2B5EF4-FFF2-40B4-BE49-F238E27FC236}">
-                <a16:creationId xmlns:a16="http://schemas.microsoft.com/office/drawing/2014/main" id="{0001B517-36EB-6546-A469-74B972A2157C}"/>
-              </a:ext>
-            </a:extLst>
-          </p:cNvPr>
-          <p:cNvSpPr txBox="1"/>
-          <p:nvPr/>
-        </p:nvSpPr>
-        <p:spPr>
-          <a:xfrm>
-            <a:off x="6236036" y="4668767"/>
-            <a:ext cx="452098" cy="369332"/>
-          </a:xfrm>
-          <a:prstGeom prst="rect">
-            <a:avLst/>
-          </a:prstGeom>
-          <a:noFill/>
-        </p:spPr>
-        <p:txBody>
-          <a:bodyPr wrap="square" rtlCol="0">
-            <a:spAutoFit/>
-          </a:bodyPr>
-          <a:lstStyle/>
-          <a:p>
-            <a:r>
               <a:rPr lang="en-US" dirty="0"/>
               <a:t>11</a:t>
-            </a:r>
-          </a:p>
-        </p:txBody>
-      </p:sp>
-      <p:sp>
-        <p:nvSpPr>
-          <p:cNvPr id="70" name="TextBox 69">
-            <a:extLst>
-              <a:ext uri="{FF2B5EF4-FFF2-40B4-BE49-F238E27FC236}">
-                <a16:creationId xmlns:a16="http://schemas.microsoft.com/office/drawing/2014/main" id="{1CC32973-E5FA-9144-AB89-F7CE25D8D58A}"/>
-              </a:ext>
-            </a:extLst>
-          </p:cNvPr>
-          <p:cNvSpPr txBox="1"/>
-          <p:nvPr/>
-        </p:nvSpPr>
-        <p:spPr>
-          <a:xfrm>
-            <a:off x="6075751" y="3804713"/>
-            <a:ext cx="452098" cy="369332"/>
-          </a:xfrm>
-          <a:prstGeom prst="rect">
-            <a:avLst/>
-          </a:prstGeom>
-          <a:noFill/>
-        </p:spPr>
-        <p:txBody>
-          <a:bodyPr wrap="square" rtlCol="0">
-            <a:spAutoFit/>
-          </a:bodyPr>
-          <a:lstStyle/>
-          <a:p>
-            <a:r>
-              <a:rPr lang="en-US" dirty="0"/>
-              <a:t>12</a:t>
-            </a:r>
-          </a:p>
-        </p:txBody>
-      </p:sp>
-      <p:sp>
-        <p:nvSpPr>
-          <p:cNvPr id="71" name="TextBox 70">
-            <a:extLst>
-              <a:ext uri="{FF2B5EF4-FFF2-40B4-BE49-F238E27FC236}">
-                <a16:creationId xmlns:a16="http://schemas.microsoft.com/office/drawing/2014/main" id="{A68BD224-4A08-6540-B684-E46FE049FB1A}"/>
-              </a:ext>
-            </a:extLst>
-          </p:cNvPr>
-          <p:cNvSpPr txBox="1"/>
-          <p:nvPr/>
-        </p:nvSpPr>
-        <p:spPr>
-          <a:xfrm>
-            <a:off x="2103586" y="4875228"/>
-            <a:ext cx="452098" cy="369332"/>
-          </a:xfrm>
-          <a:prstGeom prst="rect">
-            <a:avLst/>
-          </a:prstGeom>
-          <a:noFill/>
-        </p:spPr>
-        <p:txBody>
-          <a:bodyPr wrap="square" rtlCol="0">
-            <a:spAutoFit/>
-          </a:bodyPr>
-          <a:lstStyle/>
-          <a:p>
-            <a:r>
-              <a:rPr lang="en-US" dirty="0"/>
-              <a:t>4</a:t>
-            </a:r>
-          </a:p>
-        </p:txBody>
-      </p:sp>
-      <p:sp>
-        <p:nvSpPr>
-          <p:cNvPr id="72" name="TextBox 71">
-            <a:extLst>
-              <a:ext uri="{FF2B5EF4-FFF2-40B4-BE49-F238E27FC236}">
-                <a16:creationId xmlns:a16="http://schemas.microsoft.com/office/drawing/2014/main" id="{A6ED7794-3E3C-4841-BDBC-47E99050BDAB}"/>
-              </a:ext>
-            </a:extLst>
-          </p:cNvPr>
-          <p:cNvSpPr txBox="1"/>
-          <p:nvPr/>
-        </p:nvSpPr>
-        <p:spPr>
-          <a:xfrm>
-            <a:off x="2943325" y="4803228"/>
-            <a:ext cx="452098" cy="369332"/>
-          </a:xfrm>
-          <a:prstGeom prst="rect">
-            <a:avLst/>
-          </a:prstGeom>
-          <a:noFill/>
-        </p:spPr>
-        <p:txBody>
-          <a:bodyPr wrap="square" rtlCol="0">
-            <a:spAutoFit/>
-          </a:bodyPr>
-          <a:lstStyle/>
-          <a:p>
-            <a:r>
-              <a:rPr lang="en-US" dirty="0"/>
-              <a:t>5</a:t>
-            </a:r>
-          </a:p>
-        </p:txBody>
-      </p:sp>
-      <p:sp>
-        <p:nvSpPr>
-          <p:cNvPr id="73" name="TextBox 72">
-            <a:extLst>
-              <a:ext uri="{FF2B5EF4-FFF2-40B4-BE49-F238E27FC236}">
-                <a16:creationId xmlns:a16="http://schemas.microsoft.com/office/drawing/2014/main" id="{E1A3BB90-6F72-7D43-9DE1-C43F8E2F8946}"/>
-              </a:ext>
-            </a:extLst>
-          </p:cNvPr>
-          <p:cNvSpPr txBox="1"/>
-          <p:nvPr/>
-        </p:nvSpPr>
-        <p:spPr>
-          <a:xfrm>
-            <a:off x="3712644" y="4433896"/>
-            <a:ext cx="452098" cy="369332"/>
-          </a:xfrm>
-          <a:prstGeom prst="rect">
-            <a:avLst/>
-          </a:prstGeom>
-          <a:noFill/>
-        </p:spPr>
-        <p:txBody>
-          <a:bodyPr wrap="square" rtlCol="0">
-            <a:spAutoFit/>
-          </a:bodyPr>
-          <a:lstStyle/>
-          <a:p>
-            <a:r>
-              <a:rPr lang="en-US" dirty="0"/>
-              <a:t>6</a:t>
-            </a:r>
-          </a:p>
-        </p:txBody>
-      </p:sp>
-      <p:sp>
-        <p:nvSpPr>
-          <p:cNvPr id="74" name="TextBox 73">
-            <a:extLst>
-              <a:ext uri="{FF2B5EF4-FFF2-40B4-BE49-F238E27FC236}">
-                <a16:creationId xmlns:a16="http://schemas.microsoft.com/office/drawing/2014/main" id="{3D6738E8-58C5-D144-9E73-2080945F7656}"/>
-              </a:ext>
-            </a:extLst>
-          </p:cNvPr>
-          <p:cNvSpPr txBox="1"/>
-          <p:nvPr/>
-        </p:nvSpPr>
-        <p:spPr>
-          <a:xfrm>
-            <a:off x="4146240" y="4442364"/>
-            <a:ext cx="452098" cy="369332"/>
-          </a:xfrm>
-          <a:prstGeom prst="rect">
-            <a:avLst/>
-          </a:prstGeom>
-          <a:noFill/>
-        </p:spPr>
-        <p:txBody>
-          <a:bodyPr wrap="square" rtlCol="0">
-            <a:spAutoFit/>
-          </a:bodyPr>
-          <a:lstStyle/>
-          <a:p>
-            <a:r>
-              <a:rPr lang="en-US" dirty="0"/>
-              <a:t>7</a:t>
-            </a:r>
-          </a:p>
-        </p:txBody>
-      </p:sp>
-      <p:sp>
-        <p:nvSpPr>
-          <p:cNvPr id="75" name="TextBox 74">
-            <a:extLst>
-              <a:ext uri="{FF2B5EF4-FFF2-40B4-BE49-F238E27FC236}">
-                <a16:creationId xmlns:a16="http://schemas.microsoft.com/office/drawing/2014/main" id="{BF83BE0E-A5E4-B84D-9651-9AC9302BD1C6}"/>
-              </a:ext>
-            </a:extLst>
-          </p:cNvPr>
-          <p:cNvSpPr txBox="1"/>
-          <p:nvPr/>
-        </p:nvSpPr>
-        <p:spPr>
-          <a:xfrm>
-            <a:off x="4126960" y="3845693"/>
-            <a:ext cx="452098" cy="369332"/>
-          </a:xfrm>
-          <a:prstGeom prst="rect">
-            <a:avLst/>
-          </a:prstGeom>
-          <a:noFill/>
-        </p:spPr>
-        <p:txBody>
-          <a:bodyPr wrap="square" rtlCol="0">
-            <a:spAutoFit/>
-          </a:bodyPr>
-          <a:lstStyle/>
-          <a:p>
-            <a:r>
-              <a:rPr lang="en-US" dirty="0"/>
-              <a:t>8</a:t>
-            </a:r>
-          </a:p>
-        </p:txBody>
-      </p:sp>
-      <p:sp>
-        <p:nvSpPr>
-          <p:cNvPr id="76" name="TextBox 75">
-            <a:extLst>
-              <a:ext uri="{FF2B5EF4-FFF2-40B4-BE49-F238E27FC236}">
-                <a16:creationId xmlns:a16="http://schemas.microsoft.com/office/drawing/2014/main" id="{940C3BBF-B96C-0549-BBC3-2DF7E16B20BE}"/>
-              </a:ext>
-            </a:extLst>
-          </p:cNvPr>
-          <p:cNvSpPr txBox="1"/>
-          <p:nvPr/>
-        </p:nvSpPr>
-        <p:spPr>
-          <a:xfrm>
-            <a:off x="4413213" y="3363277"/>
-            <a:ext cx="452098" cy="369332"/>
-          </a:xfrm>
-          <a:prstGeom prst="rect">
-            <a:avLst/>
-          </a:prstGeom>
-          <a:noFill/>
-        </p:spPr>
-        <p:txBody>
-          <a:bodyPr wrap="square" rtlCol="0">
-            <a:spAutoFit/>
-          </a:bodyPr>
-          <a:lstStyle/>
-          <a:p>
-            <a:r>
-              <a:rPr lang="en-US" dirty="0"/>
-              <a:t>9</a:t>
-            </a:r>
-          </a:p>
-        </p:txBody>
-      </p:sp>
-      <p:sp>
-        <p:nvSpPr>
-          <p:cNvPr id="77" name="TextBox 76">
-            <a:extLst>
-              <a:ext uri="{FF2B5EF4-FFF2-40B4-BE49-F238E27FC236}">
-                <a16:creationId xmlns:a16="http://schemas.microsoft.com/office/drawing/2014/main" id="{B08D1365-4057-3A45-B823-2FE603C31637}"/>
-              </a:ext>
-            </a:extLst>
-          </p:cNvPr>
-          <p:cNvSpPr txBox="1"/>
-          <p:nvPr/>
-        </p:nvSpPr>
-        <p:spPr>
-          <a:xfrm>
-            <a:off x="4898080" y="3379811"/>
-            <a:ext cx="452098" cy="369332"/>
-          </a:xfrm>
-          <a:prstGeom prst="rect">
-            <a:avLst/>
-          </a:prstGeom>
-          <a:noFill/>
-        </p:spPr>
-        <p:txBody>
-          <a:bodyPr wrap="square" rtlCol="0">
-            <a:spAutoFit/>
-          </a:bodyPr>
-          <a:lstStyle/>
-          <a:p>
-            <a:r>
-              <a:rPr lang="en-US" dirty="0"/>
-              <a:t>10</a:t>
-            </a:r>
-          </a:p>
-        </p:txBody>
-      </p:sp>
-      <p:sp>
-        <p:nvSpPr>
-          <p:cNvPr id="78" name="TextBox 77">
-            <a:extLst>
-              <a:ext uri="{FF2B5EF4-FFF2-40B4-BE49-F238E27FC236}">
-                <a16:creationId xmlns:a16="http://schemas.microsoft.com/office/drawing/2014/main" id="{32663AF0-E227-4D47-B3A4-FFEE6D12406B}"/>
-              </a:ext>
-            </a:extLst>
-          </p:cNvPr>
-          <p:cNvSpPr txBox="1"/>
-          <p:nvPr/>
-        </p:nvSpPr>
-        <p:spPr>
-          <a:xfrm>
-            <a:off x="2211913" y="2617174"/>
-            <a:ext cx="452098" cy="369332"/>
-          </a:xfrm>
-          <a:prstGeom prst="rect">
-            <a:avLst/>
-          </a:prstGeom>
-          <a:noFill/>
-        </p:spPr>
-        <p:txBody>
-          <a:bodyPr wrap="square" rtlCol="0">
-            <a:spAutoFit/>
-          </a:bodyPr>
-          <a:lstStyle/>
-          <a:p>
-            <a:r>
-              <a:rPr lang="en-US" dirty="0"/>
-              <a:t>1</a:t>
-            </a:r>
-          </a:p>
-        </p:txBody>
-      </p:sp>
-      <p:sp>
-        <p:nvSpPr>
-          <p:cNvPr id="79" name="TextBox 78">
-            <a:extLst>
-              <a:ext uri="{FF2B5EF4-FFF2-40B4-BE49-F238E27FC236}">
-                <a16:creationId xmlns:a16="http://schemas.microsoft.com/office/drawing/2014/main" id="{9D8E8C6F-890B-FB4D-BA4B-37E07C706078}"/>
-              </a:ext>
-            </a:extLst>
-          </p:cNvPr>
-          <p:cNvSpPr txBox="1"/>
-          <p:nvPr/>
-        </p:nvSpPr>
-        <p:spPr>
-          <a:xfrm>
-            <a:off x="3302144" y="2564219"/>
-            <a:ext cx="452098" cy="369332"/>
-          </a:xfrm>
-          <a:prstGeom prst="rect">
-            <a:avLst/>
-          </a:prstGeom>
-          <a:noFill/>
-        </p:spPr>
-        <p:txBody>
-          <a:bodyPr wrap="square" rtlCol="0">
-            <a:spAutoFit/>
-          </a:bodyPr>
-          <a:lstStyle/>
-          <a:p>
-            <a:r>
-              <a:rPr lang="en-US" dirty="0"/>
-              <a:t>2</a:t>
-            </a:r>
-          </a:p>
-        </p:txBody>
-      </p:sp>
-      <p:sp>
-        <p:nvSpPr>
-          <p:cNvPr id="80" name="TextBox 79">
-            <a:extLst>
-              <a:ext uri="{FF2B5EF4-FFF2-40B4-BE49-F238E27FC236}">
-                <a16:creationId xmlns:a16="http://schemas.microsoft.com/office/drawing/2014/main" id="{8D644981-5BDB-CB43-B62D-5EDC0DF1C9B0}"/>
-              </a:ext>
-            </a:extLst>
-          </p:cNvPr>
-          <p:cNvSpPr txBox="1"/>
-          <p:nvPr/>
-        </p:nvSpPr>
-        <p:spPr>
-          <a:xfrm>
-            <a:off x="4802559" y="2540439"/>
-            <a:ext cx="452098" cy="369332"/>
-          </a:xfrm>
-          <a:prstGeom prst="rect">
-            <a:avLst/>
-          </a:prstGeom>
-          <a:noFill/>
-        </p:spPr>
-        <p:txBody>
-          <a:bodyPr wrap="square" rtlCol="0">
-            <a:spAutoFit/>
-          </a:bodyPr>
-          <a:lstStyle/>
-          <a:p>
-            <a:r>
-              <a:rPr lang="en-US" dirty="0"/>
-              <a:t>3</a:t>
             </a:r>
           </a:p>
         </p:txBody>
@@ -9407,7 +8058,7 @@
     </p:spTree>
     <p:extLst>
       <p:ext uri="{BB962C8B-B14F-4D97-AF65-F5344CB8AC3E}">
-        <p14:creationId xmlns:p14="http://schemas.microsoft.com/office/powerpoint/2010/main" val="2430762551"/>
+        <p14:creationId xmlns:p14="http://schemas.microsoft.com/office/powerpoint/2010/main" val="622376120"/>
       </p:ext>
     </p:extLst>
   </p:cSld>
@@ -9710,4 +8361,299 @@
     </a:ext>
   </a:extLst>
 </a:theme>
+</file>
+
+<file path=ppt/theme/theme2.xml><?xml version="1.0" encoding="utf-8"?>
+<a:theme xmlns:a="http://schemas.openxmlformats.org/drawingml/2006/main" name="Office Theme">
+  <a:themeElements>
+    <a:clrScheme name="Office">
+      <a:dk1>
+        <a:sysClr val="windowText" lastClr="000000"/>
+      </a:dk1>
+      <a:lt1>
+        <a:sysClr val="window" lastClr="FFFFFF"/>
+      </a:lt1>
+      <a:dk2>
+        <a:srgbClr val="44546A"/>
+      </a:dk2>
+      <a:lt2>
+        <a:srgbClr val="E7E6E6"/>
+      </a:lt2>
+      <a:accent1>
+        <a:srgbClr val="4472C4"/>
+      </a:accent1>
+      <a:accent2>
+        <a:srgbClr val="ED7D31"/>
+      </a:accent2>
+      <a:accent3>
+        <a:srgbClr val="A5A5A5"/>
+      </a:accent3>
+      <a:accent4>
+        <a:srgbClr val="FFC000"/>
+      </a:accent4>
+      <a:accent5>
+        <a:srgbClr val="5B9BD5"/>
+      </a:accent5>
+      <a:accent6>
+        <a:srgbClr val="70AD47"/>
+      </a:accent6>
+      <a:hlink>
+        <a:srgbClr val="0563C1"/>
+      </a:hlink>
+      <a:folHlink>
+        <a:srgbClr val="954F72"/>
+      </a:folHlink>
+    </a:clrScheme>
+    <a:fontScheme name="Office">
+      <a:majorFont>
+        <a:latin typeface="Calibri Light" panose="020F0302020204030204"/>
+        <a:ea typeface=""/>
+        <a:cs typeface=""/>
+        <a:font script="Jpan" typeface="游ゴシック Light"/>
+        <a:font script="Hang" typeface="맑은 고딕"/>
+        <a:font script="Hans" typeface="等线 Light"/>
+        <a:font script="Hant" typeface="新細明體"/>
+        <a:font script="Arab" typeface="Times New Roman"/>
+        <a:font script="Hebr" typeface="Times New Roman"/>
+        <a:font script="Thai" typeface="Angsana New"/>
+        <a:font script="Ethi" typeface="Nyala"/>
+        <a:font script="Beng" typeface="Vrinda"/>
+        <a:font script="Gujr" typeface="Shruti"/>
+        <a:font script="Khmr" typeface="MoolBoran"/>
+        <a:font script="Knda" typeface="Tunga"/>
+        <a:font script="Guru" typeface="Raavi"/>
+        <a:font script="Cans" typeface="Euphemia"/>
+        <a:font script="Cher" typeface="Plantagenet Cherokee"/>
+        <a:font script="Yiii" typeface="Microsoft Yi Baiti"/>
+        <a:font script="Tibt" typeface="Microsoft Himalaya"/>
+        <a:font script="Thaa" typeface="MV Boli"/>
+        <a:font script="Deva" typeface="Mangal"/>
+        <a:font script="Telu" typeface="Gautami"/>
+        <a:font script="Taml" typeface="Latha"/>
+        <a:font script="Syrc" typeface="Estrangelo Edessa"/>
+        <a:font script="Orya" typeface="Kalinga"/>
+        <a:font script="Mlym" typeface="Kartika"/>
+        <a:font script="Laoo" typeface="DokChampa"/>
+        <a:font script="Sinh" typeface="Iskoola Pota"/>
+        <a:font script="Mong" typeface="Mongolian Baiti"/>
+        <a:font script="Viet" typeface="Times New Roman"/>
+        <a:font script="Uigh" typeface="Microsoft Uighur"/>
+        <a:font script="Geor" typeface="Sylfaen"/>
+        <a:font script="Armn" typeface="Arial"/>
+        <a:font script="Bugi" typeface="Leelawadee UI"/>
+        <a:font script="Bopo" typeface="Microsoft JhengHei"/>
+        <a:font script="Java" typeface="Javanese Text"/>
+        <a:font script="Lisu" typeface="Segoe UI"/>
+        <a:font script="Mymr" typeface="Myanmar Text"/>
+        <a:font script="Nkoo" typeface="Ebrima"/>
+        <a:font script="Olck" typeface="Nirmala UI"/>
+        <a:font script="Osma" typeface="Ebrima"/>
+        <a:font script="Phag" typeface="Phagspa"/>
+        <a:font script="Syrn" typeface="Estrangelo Edessa"/>
+        <a:font script="Syrj" typeface="Estrangelo Edessa"/>
+        <a:font script="Syre" typeface="Estrangelo Edessa"/>
+        <a:font script="Sora" typeface="Nirmala UI"/>
+        <a:font script="Tale" typeface="Microsoft Tai Le"/>
+        <a:font script="Talu" typeface="Microsoft New Tai Lue"/>
+        <a:font script="Tfng" typeface="Ebrima"/>
+      </a:majorFont>
+      <a:minorFont>
+        <a:latin typeface="Calibri" panose="020F0502020204030204"/>
+        <a:ea typeface=""/>
+        <a:cs typeface=""/>
+        <a:font script="Jpan" typeface="游ゴシック"/>
+        <a:font script="Hang" typeface="맑은 고딕"/>
+        <a:font script="Hans" typeface="等线"/>
+        <a:font script="Hant" typeface="新細明體"/>
+        <a:font script="Arab" typeface="Arial"/>
+        <a:font script="Hebr" typeface="Arial"/>
+        <a:font script="Thai" typeface="Cordia New"/>
+        <a:font script="Ethi" typeface="Nyala"/>
+        <a:font script="Beng" typeface="Vrinda"/>
+        <a:font script="Gujr" typeface="Shruti"/>
+        <a:font script="Khmr" typeface="DaunPenh"/>
+        <a:font script="Knda" typeface="Tunga"/>
+        <a:font script="Guru" typeface="Raavi"/>
+        <a:font script="Cans" typeface="Euphemia"/>
+        <a:font script="Cher" typeface="Plantagenet Cherokee"/>
+        <a:font script="Yiii" typeface="Microsoft Yi Baiti"/>
+        <a:font script="Tibt" typeface="Microsoft Himalaya"/>
+        <a:font script="Thaa" typeface="MV Boli"/>
+        <a:font script="Deva" typeface="Mangal"/>
+        <a:font script="Telu" typeface="Gautami"/>
+        <a:font script="Taml" typeface="Latha"/>
+        <a:font script="Syrc" typeface="Estrangelo Edessa"/>
+        <a:font script="Orya" typeface="Kalinga"/>
+        <a:font script="Mlym" typeface="Kartika"/>
+        <a:font script="Laoo" typeface="DokChampa"/>
+        <a:font script="Sinh" typeface="Iskoola Pota"/>
+        <a:font script="Mong" typeface="Mongolian Baiti"/>
+        <a:font script="Viet" typeface="Arial"/>
+        <a:font script="Uigh" typeface="Microsoft Uighur"/>
+        <a:font script="Geor" typeface="Sylfaen"/>
+        <a:font script="Armn" typeface="Arial"/>
+        <a:font script="Bugi" typeface="Leelawadee UI"/>
+        <a:font script="Bopo" typeface="Microsoft JhengHei"/>
+        <a:font script="Java" typeface="Javanese Text"/>
+        <a:font script="Lisu" typeface="Segoe UI"/>
+        <a:font script="Mymr" typeface="Myanmar Text"/>
+        <a:font script="Nkoo" typeface="Ebrima"/>
+        <a:font script="Olck" typeface="Nirmala UI"/>
+        <a:font script="Osma" typeface="Ebrima"/>
+        <a:font script="Phag" typeface="Phagspa"/>
+        <a:font script="Syrn" typeface="Estrangelo Edessa"/>
+        <a:font script="Syrj" typeface="Estrangelo Edessa"/>
+        <a:font script="Syre" typeface="Estrangelo Edessa"/>
+        <a:font script="Sora" typeface="Nirmala UI"/>
+        <a:font script="Tale" typeface="Microsoft Tai Le"/>
+        <a:font script="Talu" typeface="Microsoft New Tai Lue"/>
+        <a:font script="Tfng" typeface="Ebrima"/>
+      </a:minorFont>
+    </a:fontScheme>
+    <a:fmtScheme name="Office">
+      <a:fillStyleLst>
+        <a:solidFill>
+          <a:schemeClr val="phClr"/>
+        </a:solidFill>
+        <a:gradFill rotWithShape="1">
+          <a:gsLst>
+            <a:gs pos="0">
+              <a:schemeClr val="phClr">
+                <a:lumMod val="110000"/>
+                <a:satMod val="105000"/>
+                <a:tint val="67000"/>
+              </a:schemeClr>
+            </a:gs>
+            <a:gs pos="50000">
+              <a:schemeClr val="phClr">
+                <a:lumMod val="105000"/>
+                <a:satMod val="103000"/>
+                <a:tint val="73000"/>
+              </a:schemeClr>
+            </a:gs>
+            <a:gs pos="100000">
+              <a:schemeClr val="phClr">
+                <a:lumMod val="105000"/>
+                <a:satMod val="109000"/>
+                <a:tint val="81000"/>
+              </a:schemeClr>
+            </a:gs>
+          </a:gsLst>
+          <a:lin ang="5400000" scaled="0"/>
+        </a:gradFill>
+        <a:gradFill rotWithShape="1">
+          <a:gsLst>
+            <a:gs pos="0">
+              <a:schemeClr val="phClr">
+                <a:satMod val="103000"/>
+                <a:lumMod val="102000"/>
+                <a:tint val="94000"/>
+              </a:schemeClr>
+            </a:gs>
+            <a:gs pos="50000">
+              <a:schemeClr val="phClr">
+                <a:satMod val="110000"/>
+                <a:lumMod val="100000"/>
+                <a:shade val="100000"/>
+              </a:schemeClr>
+            </a:gs>
+            <a:gs pos="100000">
+              <a:schemeClr val="phClr">
+                <a:lumMod val="99000"/>
+                <a:satMod val="120000"/>
+                <a:shade val="78000"/>
+              </a:schemeClr>
+            </a:gs>
+          </a:gsLst>
+          <a:lin ang="5400000" scaled="0"/>
+        </a:gradFill>
+      </a:fillStyleLst>
+      <a:lnStyleLst>
+        <a:ln w="6350" cap="flat" cmpd="sng" algn="ctr">
+          <a:solidFill>
+            <a:schemeClr val="phClr"/>
+          </a:solidFill>
+          <a:prstDash val="solid"/>
+          <a:miter lim="800000"/>
+        </a:ln>
+        <a:ln w="12700" cap="flat" cmpd="sng" algn="ctr">
+          <a:solidFill>
+            <a:schemeClr val="phClr"/>
+          </a:solidFill>
+          <a:prstDash val="solid"/>
+          <a:miter lim="800000"/>
+        </a:ln>
+        <a:ln w="19050" cap="flat" cmpd="sng" algn="ctr">
+          <a:solidFill>
+            <a:schemeClr val="phClr"/>
+          </a:solidFill>
+          <a:prstDash val="solid"/>
+          <a:miter lim="800000"/>
+        </a:ln>
+      </a:lnStyleLst>
+      <a:effectStyleLst>
+        <a:effectStyle>
+          <a:effectLst/>
+        </a:effectStyle>
+        <a:effectStyle>
+          <a:effectLst/>
+        </a:effectStyle>
+        <a:effectStyle>
+          <a:effectLst>
+            <a:outerShdw blurRad="57150" dist="19050" dir="5400000" algn="ctr" rotWithShape="0">
+              <a:srgbClr val="000000">
+                <a:alpha val="63000"/>
+              </a:srgbClr>
+            </a:outerShdw>
+          </a:effectLst>
+        </a:effectStyle>
+      </a:effectStyleLst>
+      <a:bgFillStyleLst>
+        <a:solidFill>
+          <a:schemeClr val="phClr"/>
+        </a:solidFill>
+        <a:solidFill>
+          <a:schemeClr val="phClr">
+            <a:tint val="95000"/>
+            <a:satMod val="170000"/>
+          </a:schemeClr>
+        </a:solidFill>
+        <a:gradFill rotWithShape="1">
+          <a:gsLst>
+            <a:gs pos="0">
+              <a:schemeClr val="phClr">
+                <a:tint val="93000"/>
+                <a:satMod val="150000"/>
+                <a:shade val="98000"/>
+                <a:lumMod val="102000"/>
+              </a:schemeClr>
+            </a:gs>
+            <a:gs pos="50000">
+              <a:schemeClr val="phClr">
+                <a:tint val="98000"/>
+                <a:satMod val="130000"/>
+                <a:shade val="90000"/>
+                <a:lumMod val="103000"/>
+              </a:schemeClr>
+            </a:gs>
+            <a:gs pos="100000">
+              <a:schemeClr val="phClr">
+                <a:shade val="63000"/>
+                <a:satMod val="120000"/>
+              </a:schemeClr>
+            </a:gs>
+          </a:gsLst>
+          <a:lin ang="5400000" scaled="0"/>
+        </a:gradFill>
+      </a:bgFillStyleLst>
+    </a:fmtScheme>
+  </a:themeElements>
+  <a:objectDefaults/>
+  <a:extraClrSchemeLst/>
+  <a:extLst>
+    <a:ext uri="{05A4C25C-085E-4340-85A3-A5531E510DB2}">
+      <thm15:themeFamily xmlns:thm15="http://schemas.microsoft.com/office/thememl/2012/main" name="Office Theme" id="{62F939B6-93AF-4DB8-9C6B-D6C7DFDC589F}" vid="{4A3C46E8-61CC-4603-A589-7422A47A8E4A}"/>
+    </a:ext>
+  </a:extLst>
+</a:theme>
 </file>
</xml_diff>